<commit_message>
remove WHY from presentation
</commit_message>
<xml_diff>
--- a/P.pptx
+++ b/P.pptx
@@ -5,36 +5,35 @@
     <p:sldMasterId id="2147483707" r:id="rId1"/>
   </p:sldMasterIdLst>
   <p:notesMasterIdLst>
-    <p:notesMasterId r:id="rId29"/>
+    <p:notesMasterId r:id="rId28"/>
   </p:notesMasterIdLst>
   <p:sldIdLst>
     <p:sldId id="256" r:id="rId2"/>
     <p:sldId id="258" r:id="rId3"/>
     <p:sldId id="280" r:id="rId4"/>
-    <p:sldId id="279" r:id="rId5"/>
-    <p:sldId id="260" r:id="rId6"/>
-    <p:sldId id="285" r:id="rId7"/>
-    <p:sldId id="262" r:id="rId8"/>
-    <p:sldId id="261" r:id="rId9"/>
-    <p:sldId id="264" r:id="rId10"/>
-    <p:sldId id="281" r:id="rId11"/>
-    <p:sldId id="266" r:id="rId12"/>
-    <p:sldId id="267" r:id="rId13"/>
-    <p:sldId id="282" r:id="rId14"/>
-    <p:sldId id="268" r:id="rId15"/>
-    <p:sldId id="269" r:id="rId16"/>
-    <p:sldId id="270" r:id="rId17"/>
-    <p:sldId id="271" r:id="rId18"/>
-    <p:sldId id="286" r:id="rId19"/>
-    <p:sldId id="283" r:id="rId20"/>
-    <p:sldId id="274" r:id="rId21"/>
-    <p:sldId id="277" r:id="rId22"/>
-    <p:sldId id="272" r:id="rId23"/>
-    <p:sldId id="265" r:id="rId24"/>
-    <p:sldId id="273" r:id="rId25"/>
-    <p:sldId id="276" r:id="rId26"/>
-    <p:sldId id="284" r:id="rId27"/>
-    <p:sldId id="278" r:id="rId28"/>
+    <p:sldId id="260" r:id="rId5"/>
+    <p:sldId id="285" r:id="rId6"/>
+    <p:sldId id="262" r:id="rId7"/>
+    <p:sldId id="261" r:id="rId8"/>
+    <p:sldId id="264" r:id="rId9"/>
+    <p:sldId id="281" r:id="rId10"/>
+    <p:sldId id="266" r:id="rId11"/>
+    <p:sldId id="267" r:id="rId12"/>
+    <p:sldId id="282" r:id="rId13"/>
+    <p:sldId id="268" r:id="rId14"/>
+    <p:sldId id="269" r:id="rId15"/>
+    <p:sldId id="270" r:id="rId16"/>
+    <p:sldId id="271" r:id="rId17"/>
+    <p:sldId id="286" r:id="rId18"/>
+    <p:sldId id="283" r:id="rId19"/>
+    <p:sldId id="274" r:id="rId20"/>
+    <p:sldId id="277" r:id="rId21"/>
+    <p:sldId id="272" r:id="rId22"/>
+    <p:sldId id="265" r:id="rId23"/>
+    <p:sldId id="273" r:id="rId24"/>
+    <p:sldId id="276" r:id="rId25"/>
+    <p:sldId id="284" r:id="rId26"/>
+    <p:sldId id="278" r:id="rId27"/>
   </p:sldIdLst>
   <p:sldSz cx="12192000" cy="6858000"/>
   <p:notesSz cx="6858000" cy="9144000"/>
@@ -141,7 +140,6 @@
             <p14:sldId id="256"/>
             <p14:sldId id="258"/>
             <p14:sldId id="280"/>
-            <p14:sldId id="279"/>
             <p14:sldId id="260"/>
           </p14:sldIdLst>
         </p14:section>
@@ -22321,7 +22319,7 @@
           <a:p>
             <a:fld id="{56A18366-A052-44AE-8A83-03448C514A16}" type="datetimeFigureOut">
               <a:rPr lang="en-US" smtClean="0"/>
-              <a:t>7/4/2017</a:t>
+              <a:t>7/10/2017</a:t>
             </a:fld>
             <a:endParaRPr lang="en-US"/>
           </a:p>
@@ -22749,16 +22747,12 @@
           <a:lstStyle/>
           <a:p>
             <a:r>
-              <a:rPr lang="ru-RU" baseline="0" dirty="0"/>
-              <a:t>Почему необходимо вызывать каждый раз </a:t>
+              <a:rPr lang="ru-RU" dirty="0"/>
+              <a:t>Рассказ про то, как</a:t>
             </a:r>
             <a:r>
-              <a:rPr lang="en-US" baseline="0" dirty="0" err="1"/>
-              <a:t>GetSuitableCtor</a:t>
-            </a:r>
-            <a:r>
-              <a:rPr lang="en-US" baseline="0" dirty="0"/>
-              <a:t>()</a:t>
+              <a:rPr lang="ru-RU" baseline="0" dirty="0"/>
+              <a:t> решить проблему множественного пересоздания дерева</a:t>
             </a:r>
             <a:endParaRPr lang="en-US" dirty="0"/>
           </a:p>
@@ -22790,98 +22784,6 @@
     </p:spTree>
     <p:extLst>
       <p:ext uri="{BB962C8B-B14F-4D97-AF65-F5344CB8AC3E}">
-        <p14:creationId xmlns:p14="http://schemas.microsoft.com/office/powerpoint/2010/main" val="1998522180"/>
-      </p:ext>
-    </p:extLst>
-  </p:cSld>
-  <p:clrMapOvr>
-    <a:masterClrMapping/>
-  </p:clrMapOvr>
-</p:notes>
-</file>
-
-<file path=ppt/notesSlides/notesSlide11.xml><?xml version="1.0" encoding="utf-8"?>
-<p:notes xmlns:a="http://schemas.openxmlformats.org/drawingml/2006/main" xmlns:r="http://schemas.openxmlformats.org/officeDocument/2006/relationships" xmlns:p="http://schemas.openxmlformats.org/presentationml/2006/main">
-  <p:cSld>
-    <p:spTree>
-      <p:nvGrpSpPr>
-        <p:cNvPr id="1" name=""/>
-        <p:cNvGrpSpPr/>
-        <p:nvPr/>
-      </p:nvGrpSpPr>
-      <p:grpSpPr>
-        <a:xfrm>
-          <a:off x="0" y="0"/>
-          <a:ext cx="0" cy="0"/>
-          <a:chOff x="0" y="0"/>
-          <a:chExt cx="0" cy="0"/>
-        </a:xfrm>
-      </p:grpSpPr>
-      <p:sp>
-        <p:nvSpPr>
-          <p:cNvPr id="2" name="Slide Image Placeholder 1"/>
-          <p:cNvSpPr>
-            <a:spLocks noGrp="1" noRot="1" noChangeAspect="1"/>
-          </p:cNvSpPr>
-          <p:nvPr>
-            <p:ph type="sldImg"/>
-          </p:nvPr>
-        </p:nvSpPr>
-        <p:spPr/>
-      </p:sp>
-      <p:sp>
-        <p:nvSpPr>
-          <p:cNvPr id="3" name="Notes Placeholder 2"/>
-          <p:cNvSpPr>
-            <a:spLocks noGrp="1"/>
-          </p:cNvSpPr>
-          <p:nvPr>
-            <p:ph type="body" idx="1"/>
-          </p:nvPr>
-        </p:nvSpPr>
-        <p:spPr/>
-        <p:txBody>
-          <a:bodyPr/>
-          <a:lstStyle/>
-          <a:p>
-            <a:r>
-              <a:rPr lang="ru-RU" dirty="0"/>
-              <a:t>Рассказ про то, как</a:t>
-            </a:r>
-            <a:r>
-              <a:rPr lang="ru-RU" baseline="0" dirty="0"/>
-              <a:t> решить проблему множественного пересоздания дерева</a:t>
-            </a:r>
-            <a:endParaRPr lang="en-US" dirty="0"/>
-          </a:p>
-        </p:txBody>
-      </p:sp>
-      <p:sp>
-        <p:nvSpPr>
-          <p:cNvPr id="4" name="Slide Number Placeholder 3"/>
-          <p:cNvSpPr>
-            <a:spLocks noGrp="1"/>
-          </p:cNvSpPr>
-          <p:nvPr>
-            <p:ph type="sldNum" sz="quarter" idx="10"/>
-          </p:nvPr>
-        </p:nvSpPr>
-        <p:spPr/>
-        <p:txBody>
-          <a:bodyPr/>
-          <a:lstStyle/>
-          <a:p>
-            <a:fld id="{A8056219-52E5-46EB-8402-B0D5886D658D}" type="slidenum">
-              <a:rPr lang="en-US" smtClean="0"/>
-              <a:t>25</a:t>
-            </a:fld>
-            <a:endParaRPr lang="en-US"/>
-          </a:p>
-        </p:txBody>
-      </p:sp>
-    </p:spTree>
-    <p:extLst>
-      <p:ext uri="{BB962C8B-B14F-4D97-AF65-F5344CB8AC3E}">
         <p14:creationId xmlns:p14="http://schemas.microsoft.com/office/powerpoint/2010/main" val="816151231"/>
       </p:ext>
     </p:extLst>
@@ -22893,108 +22795,6 @@
 </file>
 
 <file path=ppt/notesSlides/notesSlide2.xml><?xml version="1.0" encoding="utf-8"?>
-<p:notes xmlns:a="http://schemas.openxmlformats.org/drawingml/2006/main" xmlns:r="http://schemas.openxmlformats.org/officeDocument/2006/relationships" xmlns:p="http://schemas.openxmlformats.org/presentationml/2006/main">
-  <p:cSld>
-    <p:spTree>
-      <p:nvGrpSpPr>
-        <p:cNvPr id="1" name=""/>
-        <p:cNvGrpSpPr/>
-        <p:nvPr/>
-      </p:nvGrpSpPr>
-      <p:grpSpPr>
-        <a:xfrm>
-          <a:off x="0" y="0"/>
-          <a:ext cx="0" cy="0"/>
-          <a:chOff x="0" y="0"/>
-          <a:chExt cx="0" cy="0"/>
-        </a:xfrm>
-      </p:grpSpPr>
-      <p:sp>
-        <p:nvSpPr>
-          <p:cNvPr id="2" name="Slide Image Placeholder 1"/>
-          <p:cNvSpPr>
-            <a:spLocks noGrp="1" noRot="1" noChangeAspect="1"/>
-          </p:cNvSpPr>
-          <p:nvPr>
-            <p:ph type="sldImg"/>
-          </p:nvPr>
-        </p:nvSpPr>
-        <p:spPr/>
-      </p:sp>
-      <p:sp>
-        <p:nvSpPr>
-          <p:cNvPr id="3" name="Notes Placeholder 2"/>
-          <p:cNvSpPr>
-            <a:spLocks noGrp="1"/>
-          </p:cNvSpPr>
-          <p:nvPr>
-            <p:ph type="body" idx="1"/>
-          </p:nvPr>
-        </p:nvSpPr>
-        <p:spPr/>
-        <p:txBody>
-          <a:bodyPr/>
-          <a:lstStyle/>
-          <a:p>
-            <a:r>
-              <a:rPr lang="ru-RU" dirty="0"/>
-              <a:t>Последовательность выполнения методов и Dto со сложной логикой валидации</a:t>
-            </a:r>
-            <a:endParaRPr lang="en-US" dirty="0"/>
-          </a:p>
-          <a:p>
-            <a:r>
-              <a:rPr lang="ru-RU" dirty="0"/>
-              <a:t>Я часто опечатываюсь, вводя несколько точек подряд</a:t>
-            </a:r>
-            <a:endParaRPr lang="en-US" dirty="0"/>
-          </a:p>
-          <a:p>
-            <a:r>
-              <a:rPr lang="ru-RU" dirty="0"/>
-              <a:t>Применение правил по пректно</a:t>
-            </a:r>
-            <a:endParaRPr lang="en-US" dirty="0"/>
-          </a:p>
-        </p:txBody>
-      </p:sp>
-      <p:sp>
-        <p:nvSpPr>
-          <p:cNvPr id="4" name="Slide Number Placeholder 3"/>
-          <p:cNvSpPr>
-            <a:spLocks noGrp="1"/>
-          </p:cNvSpPr>
-          <p:nvPr>
-            <p:ph type="sldNum" sz="quarter" idx="10"/>
-          </p:nvPr>
-        </p:nvSpPr>
-        <p:spPr/>
-        <p:txBody>
-          <a:bodyPr/>
-          <a:lstStyle/>
-          <a:p>
-            <a:fld id="{A8056219-52E5-46EB-8402-B0D5886D658D}" type="slidenum">
-              <a:rPr lang="en-US" smtClean="0"/>
-              <a:t>4</a:t>
-            </a:fld>
-            <a:endParaRPr lang="en-US"/>
-          </a:p>
-        </p:txBody>
-      </p:sp>
-    </p:spTree>
-    <p:extLst>
-      <p:ext uri="{BB962C8B-B14F-4D97-AF65-F5344CB8AC3E}">
-        <p14:creationId xmlns:p14="http://schemas.microsoft.com/office/powerpoint/2010/main" val="3547616911"/>
-      </p:ext>
-    </p:extLst>
-  </p:cSld>
-  <p:clrMapOvr>
-    <a:masterClrMapping/>
-  </p:clrMapOvr>
-</p:notes>
-</file>
-
-<file path=ppt/notesSlides/notesSlide3.xml><?xml version="1.0" encoding="utf-8"?>
 <p:notes xmlns:a="http://schemas.openxmlformats.org/drawingml/2006/main" xmlns:r="http://schemas.openxmlformats.org/officeDocument/2006/relationships" xmlns:p="http://schemas.openxmlformats.org/presentationml/2006/main">
   <p:cSld>
     <p:spTree>
@@ -23059,7 +22859,7 @@
           <a:p>
             <a:fld id="{A8056219-52E5-46EB-8402-B0D5886D658D}" type="slidenum">
               <a:rPr lang="en-US" smtClean="0"/>
-              <a:t>5</a:t>
+              <a:t>4</a:t>
             </a:fld>
             <a:endParaRPr lang="en-US"/>
           </a:p>
@@ -23078,7 +22878,7 @@
 </p:notes>
 </file>
 
-<file path=ppt/notesSlides/notesSlide4.xml><?xml version="1.0" encoding="utf-8"?>
+<file path=ppt/notesSlides/notesSlide3.xml><?xml version="1.0" encoding="utf-8"?>
 <p:notes xmlns:a="http://schemas.openxmlformats.org/drawingml/2006/main" xmlns:r="http://schemas.openxmlformats.org/officeDocument/2006/relationships" xmlns:p="http://schemas.openxmlformats.org/presentationml/2006/main">
   <p:cSld>
     <p:spTree>
@@ -23168,7 +22968,7 @@
           <a:p>
             <a:fld id="{A8056219-52E5-46EB-8402-B0D5886D658D}" type="slidenum">
               <a:rPr lang="en-US" smtClean="0"/>
-              <a:t>7</a:t>
+              <a:t>6</a:t>
             </a:fld>
             <a:endParaRPr lang="en-US"/>
           </a:p>
@@ -23187,7 +22987,7 @@
 </p:notes>
 </file>
 
-<file path=ppt/notesSlides/notesSlide5.xml><?xml version="1.0" encoding="utf-8"?>
+<file path=ppt/notesSlides/notesSlide4.xml><?xml version="1.0" encoding="utf-8"?>
 <p:notes xmlns:a="http://schemas.openxmlformats.org/drawingml/2006/main" xmlns:r="http://schemas.openxmlformats.org/officeDocument/2006/relationships" xmlns:p="http://schemas.openxmlformats.org/presentationml/2006/main">
   <p:cSld>
     <p:spTree>
@@ -23272,7 +23072,7 @@
           <a:p>
             <a:fld id="{A8056219-52E5-46EB-8402-B0D5886D658D}" type="slidenum">
               <a:rPr lang="en-US" smtClean="0"/>
-              <a:t>11</a:t>
+              <a:t>10</a:t>
             </a:fld>
             <a:endParaRPr lang="en-US"/>
           </a:p>
@@ -23291,7 +23091,7 @@
 </p:notes>
 </file>
 
-<file path=ppt/notesSlides/notesSlide6.xml><?xml version="1.0" encoding="utf-8"?>
+<file path=ppt/notesSlides/notesSlide5.xml><?xml version="1.0" encoding="utf-8"?>
 <p:notes xmlns:a="http://schemas.openxmlformats.org/drawingml/2006/main" xmlns:r="http://schemas.openxmlformats.org/officeDocument/2006/relationships" xmlns:p="http://schemas.openxmlformats.org/presentationml/2006/main">
   <p:cSld>
     <p:spTree>
@@ -23364,7 +23164,7 @@
           <a:p>
             <a:fld id="{A8056219-52E5-46EB-8402-B0D5886D658D}" type="slidenum">
               <a:rPr lang="en-US" smtClean="0"/>
-              <a:t>13</a:t>
+              <a:t>12</a:t>
             </a:fld>
             <a:endParaRPr lang="en-US"/>
           </a:p>
@@ -23383,7 +23183,7 @@
 </p:notes>
 </file>
 
-<file path=ppt/notesSlides/notesSlide7.xml><?xml version="1.0" encoding="utf-8"?>
+<file path=ppt/notesSlides/notesSlide6.xml><?xml version="1.0" encoding="utf-8"?>
 <p:notes xmlns:a="http://schemas.openxmlformats.org/drawingml/2006/main" xmlns:r="http://schemas.openxmlformats.org/officeDocument/2006/relationships" xmlns:p="http://schemas.openxmlformats.org/presentationml/2006/main">
   <p:cSld>
     <p:spTree>
@@ -23460,7 +23260,7 @@
           <a:p>
             <a:fld id="{A8056219-52E5-46EB-8402-B0D5886D658D}" type="slidenum">
               <a:rPr lang="en-US" smtClean="0"/>
-              <a:t>15</a:t>
+              <a:t>14</a:t>
             </a:fld>
             <a:endParaRPr lang="en-US"/>
           </a:p>
@@ -23479,7 +23279,7 @@
 </p:notes>
 </file>
 
-<file path=ppt/notesSlides/notesSlide8.xml><?xml version="1.0" encoding="utf-8"?>
+<file path=ppt/notesSlides/notesSlide7.xml><?xml version="1.0" encoding="utf-8"?>
 <p:notes xmlns:a="http://schemas.openxmlformats.org/drawingml/2006/main" xmlns:r="http://schemas.openxmlformats.org/officeDocument/2006/relationships" xmlns:p="http://schemas.openxmlformats.org/presentationml/2006/main">
   <p:cSld>
     <p:spTree>
@@ -23552,7 +23352,7 @@
           <a:p>
             <a:fld id="{A8056219-52E5-46EB-8402-B0D5886D658D}" type="slidenum">
               <a:rPr lang="en-US" smtClean="0"/>
-              <a:t>19</a:t>
+              <a:t>18</a:t>
             </a:fld>
             <a:endParaRPr lang="en-US"/>
           </a:p>
@@ -23571,7 +23371,7 @@
 </p:notes>
 </file>
 
-<file path=ppt/notesSlides/notesSlide9.xml><?xml version="1.0" encoding="utf-8"?>
+<file path=ppt/notesSlides/notesSlide8.xml><?xml version="1.0" encoding="utf-8"?>
 <p:notes xmlns:a="http://schemas.openxmlformats.org/drawingml/2006/main" xmlns:r="http://schemas.openxmlformats.org/officeDocument/2006/relationships" xmlns:p="http://schemas.openxmlformats.org/presentationml/2006/main">
   <p:cSld>
     <p:spTree>
@@ -23656,6 +23456,102 @@
           <a:p>
             <a:fld id="{A8056219-52E5-46EB-8402-B0D5886D658D}" type="slidenum">
               <a:rPr lang="en-US" smtClean="0"/>
+              <a:t>22</a:t>
+            </a:fld>
+            <a:endParaRPr lang="en-US"/>
+          </a:p>
+        </p:txBody>
+      </p:sp>
+    </p:spTree>
+    <p:extLst>
+      <p:ext uri="{BB962C8B-B14F-4D97-AF65-F5344CB8AC3E}">
+        <p14:creationId xmlns:p14="http://schemas.microsoft.com/office/powerpoint/2010/main" val="1910721752"/>
+      </p:ext>
+    </p:extLst>
+  </p:cSld>
+  <p:clrMapOvr>
+    <a:masterClrMapping/>
+  </p:clrMapOvr>
+</p:notes>
+</file>
+
+<file path=ppt/notesSlides/notesSlide9.xml><?xml version="1.0" encoding="utf-8"?>
+<p:notes xmlns:a="http://schemas.openxmlformats.org/drawingml/2006/main" xmlns:r="http://schemas.openxmlformats.org/officeDocument/2006/relationships" xmlns:p="http://schemas.openxmlformats.org/presentationml/2006/main">
+  <p:cSld>
+    <p:spTree>
+      <p:nvGrpSpPr>
+        <p:cNvPr id="1" name=""/>
+        <p:cNvGrpSpPr/>
+        <p:nvPr/>
+      </p:nvGrpSpPr>
+      <p:grpSpPr>
+        <a:xfrm>
+          <a:off x="0" y="0"/>
+          <a:ext cx="0" cy="0"/>
+          <a:chOff x="0" y="0"/>
+          <a:chExt cx="0" cy="0"/>
+        </a:xfrm>
+      </p:grpSpPr>
+      <p:sp>
+        <p:nvSpPr>
+          <p:cNvPr id="2" name="Slide Image Placeholder 1"/>
+          <p:cNvSpPr>
+            <a:spLocks noGrp="1" noRot="1" noChangeAspect="1"/>
+          </p:cNvSpPr>
+          <p:nvPr>
+            <p:ph type="sldImg"/>
+          </p:nvPr>
+        </p:nvSpPr>
+        <p:spPr/>
+      </p:sp>
+      <p:sp>
+        <p:nvSpPr>
+          <p:cNvPr id="3" name="Notes Placeholder 2"/>
+          <p:cNvSpPr>
+            <a:spLocks noGrp="1"/>
+          </p:cNvSpPr>
+          <p:nvPr>
+            <p:ph type="body" idx="1"/>
+          </p:nvPr>
+        </p:nvSpPr>
+        <p:spPr/>
+        <p:txBody>
+          <a:bodyPr/>
+          <a:lstStyle/>
+          <a:p>
+            <a:r>
+              <a:rPr lang="ru-RU" baseline="0" dirty="0"/>
+              <a:t>Почему необходимо вызывать каждый раз </a:t>
+            </a:r>
+            <a:r>
+              <a:rPr lang="en-US" baseline="0" dirty="0" err="1"/>
+              <a:t>GetSuitableCtor</a:t>
+            </a:r>
+            <a:r>
+              <a:rPr lang="en-US" baseline="0" dirty="0"/>
+              <a:t>()</a:t>
+            </a:r>
+            <a:endParaRPr lang="en-US" dirty="0"/>
+          </a:p>
+        </p:txBody>
+      </p:sp>
+      <p:sp>
+        <p:nvSpPr>
+          <p:cNvPr id="4" name="Slide Number Placeholder 3"/>
+          <p:cNvSpPr>
+            <a:spLocks noGrp="1"/>
+          </p:cNvSpPr>
+          <p:nvPr>
+            <p:ph type="sldNum" sz="quarter" idx="10"/>
+          </p:nvPr>
+        </p:nvSpPr>
+        <p:spPr/>
+        <p:txBody>
+          <a:bodyPr/>
+          <a:lstStyle/>
+          <a:p>
+            <a:fld id="{A8056219-52E5-46EB-8402-B0D5886D658D}" type="slidenum">
+              <a:rPr lang="en-US" smtClean="0"/>
               <a:t>23</a:t>
             </a:fld>
             <a:endParaRPr lang="en-US"/>
@@ -23665,7 +23561,7 @@
     </p:spTree>
     <p:extLst>
       <p:ext uri="{BB962C8B-B14F-4D97-AF65-F5344CB8AC3E}">
-        <p14:creationId xmlns:p14="http://schemas.microsoft.com/office/powerpoint/2010/main" val="1910721752"/>
+        <p14:creationId xmlns:p14="http://schemas.microsoft.com/office/powerpoint/2010/main" val="1998522180"/>
       </p:ext>
     </p:extLst>
   </p:cSld>
@@ -24078,7 +23974,7 @@
           <a:p>
             <a:fld id="{A5EF53D7-1ACF-4A2A-9E6D-232E03173C8B}" type="datetimeFigureOut">
               <a:rPr lang="en-US" smtClean="0"/>
-              <a:t>7/4/2017</a:t>
+              <a:t>7/10/2017</a:t>
             </a:fld>
             <a:endParaRPr lang="en-US"/>
           </a:p>
@@ -24257,7 +24153,7 @@
           <a:p>
             <a:fld id="{A5EF53D7-1ACF-4A2A-9E6D-232E03173C8B}" type="datetimeFigureOut">
               <a:rPr lang="en-US" smtClean="0"/>
-              <a:t>7/4/2017</a:t>
+              <a:t>7/10/2017</a:t>
             </a:fld>
             <a:endParaRPr lang="en-US"/>
           </a:p>
@@ -24437,7 +24333,7 @@
           <a:p>
             <a:fld id="{A5EF53D7-1ACF-4A2A-9E6D-232E03173C8B}" type="datetimeFigureOut">
               <a:rPr lang="en-US" smtClean="0"/>
-              <a:t>7/4/2017</a:t>
+              <a:t>7/10/2017</a:t>
             </a:fld>
             <a:endParaRPr lang="en-US"/>
           </a:p>
@@ -24607,7 +24503,7 @@
           <a:p>
             <a:fld id="{A5EF53D7-1ACF-4A2A-9E6D-232E03173C8B}" type="datetimeFigureOut">
               <a:rPr lang="en-US" smtClean="0"/>
-              <a:t>7/4/2017</a:t>
+              <a:t>7/10/2017</a:t>
             </a:fld>
             <a:endParaRPr lang="en-US"/>
           </a:p>
@@ -24920,7 +24816,7 @@
           <a:p>
             <a:fld id="{A5EF53D7-1ACF-4A2A-9E6D-232E03173C8B}" type="datetimeFigureOut">
               <a:rPr lang="en-US" smtClean="0"/>
-              <a:t>7/4/2017</a:t>
+              <a:t>7/10/2017</a:t>
             </a:fld>
             <a:endParaRPr lang="en-US"/>
           </a:p>
@@ -25306,7 +25202,7 @@
           <a:p>
             <a:fld id="{A5EF53D7-1ACF-4A2A-9E6D-232E03173C8B}" type="datetimeFigureOut">
               <a:rPr lang="en-US" smtClean="0"/>
-              <a:t>7/4/2017</a:t>
+              <a:t>7/10/2017</a:t>
             </a:fld>
             <a:endParaRPr lang="en-US"/>
           </a:p>
@@ -25740,7 +25636,7 @@
           <a:p>
             <a:fld id="{A5EF53D7-1ACF-4A2A-9E6D-232E03173C8B}" type="datetimeFigureOut">
               <a:rPr lang="en-US" smtClean="0"/>
-              <a:t>7/4/2017</a:t>
+              <a:t>7/10/2017</a:t>
             </a:fld>
             <a:endParaRPr lang="en-US"/>
           </a:p>
@@ -25858,7 +25754,7 @@
           <a:p>
             <a:fld id="{A5EF53D7-1ACF-4A2A-9E6D-232E03173C8B}" type="datetimeFigureOut">
               <a:rPr lang="en-US" smtClean="0"/>
-              <a:t>7/4/2017</a:t>
+              <a:t>7/10/2017</a:t>
             </a:fld>
             <a:endParaRPr lang="en-US"/>
           </a:p>
@@ -25953,7 +25849,7 @@
           <a:p>
             <a:fld id="{A5EF53D7-1ACF-4A2A-9E6D-232E03173C8B}" type="datetimeFigureOut">
               <a:rPr lang="en-US" smtClean="0"/>
-              <a:t>7/4/2017</a:t>
+              <a:t>7/10/2017</a:t>
             </a:fld>
             <a:endParaRPr lang="en-US"/>
           </a:p>
@@ -26303,7 +26199,7 @@
           <a:p>
             <a:fld id="{A5EF53D7-1ACF-4A2A-9E6D-232E03173C8B}" type="datetimeFigureOut">
               <a:rPr lang="en-US" smtClean="0"/>
-              <a:t>7/4/2017</a:t>
+              <a:t>7/10/2017</a:t>
             </a:fld>
             <a:endParaRPr lang="en-US"/>
           </a:p>
@@ -26728,7 +26624,7 @@
           <a:p>
             <a:fld id="{A5EF53D7-1ACF-4A2A-9E6D-232E03173C8B}" type="datetimeFigureOut">
               <a:rPr lang="en-US" smtClean="0"/>
-              <a:t>7/4/2017</a:t>
+              <a:t>7/10/2017</a:t>
             </a:fld>
             <a:endParaRPr lang="en-US"/>
           </a:p>
@@ -27009,7 +26905,7 @@
           <a:p>
             <a:fld id="{A5EF53D7-1ACF-4A2A-9E6D-232E03173C8B}" type="datetimeFigureOut">
               <a:rPr lang="en-US" smtClean="0"/>
-              <a:t>7/4/2017</a:t>
+              <a:t>7/10/2017</a:t>
             </a:fld>
             <a:endParaRPr lang="en-US"/>
           </a:p>
@@ -27670,127 +27566,6 @@
             <p:ph type="title"/>
           </p:nvPr>
         </p:nvSpPr>
-        <p:spPr>
-          <a:xfrm>
-            <a:off x="8549639" y="685800"/>
-            <a:ext cx="3513051" cy="1737360"/>
-          </a:xfrm>
-        </p:spPr>
-        <p:txBody>
-          <a:bodyPr>
-            <a:normAutofit fontScale="90000"/>
-          </a:bodyPr>
-          <a:lstStyle/>
-          <a:p>
-            <a:r>
-              <a:rPr lang="ru-RU" dirty="0">
-                <a:solidFill>
-                  <a:schemeClr val="accent1"/>
-                </a:solidFill>
-              </a:rPr>
-              <a:t>Неочевидность №3:</a:t>
-            </a:r>
-            <a:br>
-              <a:rPr lang="ru-RU" dirty="0"/>
-            </a:br>
-            <a:r>
-              <a:rPr lang="ru-RU" dirty="0"/>
-              <a:t>100 простых анализаторов</a:t>
-            </a:r>
-            <a:endParaRPr lang="en-US" dirty="0"/>
-          </a:p>
-        </p:txBody>
-      </p:sp>
-      <p:sp>
-        <p:nvSpPr>
-          <p:cNvPr id="4" name="Subtitle 3"/>
-          <p:cNvSpPr>
-            <a:spLocks noGrp="1"/>
-          </p:cNvSpPr>
-          <p:nvPr>
-            <p:ph type="body" sz="half" idx="2"/>
-          </p:nvPr>
-        </p:nvSpPr>
-        <p:spPr/>
-        <p:txBody>
-          <a:bodyPr>
-            <a:normAutofit/>
-          </a:bodyPr>
-          <a:lstStyle/>
-          <a:p>
-            <a:r>
-              <a:rPr lang="ru-RU" sz="2400" dirty="0"/>
-              <a:t>Лучше одного сложного!</a:t>
-            </a:r>
-            <a:endParaRPr lang="en-US" sz="2400" dirty="0"/>
-          </a:p>
-        </p:txBody>
-      </p:sp>
-      <p:pic>
-        <p:nvPicPr>
-          <p:cNvPr id="8" name="Picture Placeholder 7"/>
-          <p:cNvPicPr>
-            <a:picLocks noGrp="1" noChangeAspect="1"/>
-          </p:cNvPicPr>
-          <p:nvPr>
-            <p:ph type="pic" idx="1"/>
-          </p:nvPr>
-        </p:nvPicPr>
-        <p:blipFill>
-          <a:blip r:embed="rId2">
-            <a:extLst>
-              <a:ext uri="{28A0092B-C50C-407E-A947-70E740481C1C}">
-                <a14:useLocalDpi xmlns:a14="http://schemas.microsoft.com/office/drawing/2010/main" val="0"/>
-              </a:ext>
-            </a:extLst>
-          </a:blip>
-          <a:srcRect l="15944" r="15944"/>
-          <a:stretch>
-            <a:fillRect/>
-          </a:stretch>
-        </p:blipFill>
-        <p:spPr/>
-      </p:pic>
-    </p:spTree>
-    <p:extLst>
-      <p:ext uri="{BB962C8B-B14F-4D97-AF65-F5344CB8AC3E}">
-        <p14:creationId xmlns:p14="http://schemas.microsoft.com/office/powerpoint/2010/main" val="730781295"/>
-      </p:ext>
-    </p:extLst>
-  </p:cSld>
-  <p:clrMapOvr>
-    <a:masterClrMapping/>
-  </p:clrMapOvr>
-</p:sld>
-</file>
-
-<file path=ppt/slides/slide11.xml><?xml version="1.0" encoding="utf-8"?>
-<p:sld xmlns:a="http://schemas.openxmlformats.org/drawingml/2006/main" xmlns:r="http://schemas.openxmlformats.org/officeDocument/2006/relationships" xmlns:p="http://schemas.openxmlformats.org/presentationml/2006/main">
-  <p:cSld>
-    <p:spTree>
-      <p:nvGrpSpPr>
-        <p:cNvPr id="1" name=""/>
-        <p:cNvGrpSpPr/>
-        <p:nvPr/>
-      </p:nvGrpSpPr>
-      <p:grpSpPr>
-        <a:xfrm>
-          <a:off x="0" y="0"/>
-          <a:ext cx="0" cy="0"/>
-          <a:chOff x="0" y="0"/>
-          <a:chExt cx="0" cy="0"/>
-        </a:xfrm>
-      </p:grpSpPr>
-      <p:sp>
-        <p:nvSpPr>
-          <p:cNvPr id="2" name="Title 1"/>
-          <p:cNvSpPr>
-            <a:spLocks noGrp="1"/>
-          </p:cNvSpPr>
-          <p:nvPr>
-            <p:ph type="title"/>
-          </p:nvPr>
-        </p:nvSpPr>
         <p:spPr/>
         <p:txBody>
           <a:bodyPr>
@@ -27863,7 +27638,7 @@
 </p:sld>
 </file>
 
-<file path=ppt/slides/slide12.xml><?xml version="1.0" encoding="utf-8"?>
+<file path=ppt/slides/slide11.xml><?xml version="1.0" encoding="utf-8"?>
 <p:sld xmlns:a="http://schemas.openxmlformats.org/drawingml/2006/main" xmlns:r="http://schemas.openxmlformats.org/officeDocument/2006/relationships" xmlns:p="http://schemas.openxmlformats.org/presentationml/2006/main">
   <p:cSld>
     <p:spTree>
@@ -28044,7 +27819,7 @@
 </p:sld>
 </file>
 
-<file path=ppt/slides/slide13.xml><?xml version="1.0" encoding="utf-8"?>
+<file path=ppt/slides/slide12.xml><?xml version="1.0" encoding="utf-8"?>
 <p:sld xmlns:a="http://schemas.openxmlformats.org/drawingml/2006/main" xmlns:r="http://schemas.openxmlformats.org/officeDocument/2006/relationships" xmlns:p="http://schemas.openxmlformats.org/presentationml/2006/main">
   <p:cSld>
     <p:spTree>
@@ -28135,7 +27910,7 @@
 </p:sld>
 </file>
 
-<file path=ppt/slides/slide14.xml><?xml version="1.0" encoding="utf-8"?>
+<file path=ppt/slides/slide13.xml><?xml version="1.0" encoding="utf-8"?>
 <p:sld xmlns:a="http://schemas.openxmlformats.org/drawingml/2006/main" xmlns:r="http://schemas.openxmlformats.org/officeDocument/2006/relationships" xmlns:p="http://schemas.openxmlformats.org/presentationml/2006/main">
   <p:cSld>
     <p:spTree>
@@ -28242,7 +28017,7 @@
 </p:sld>
 </file>
 
-<file path=ppt/slides/slide15.xml><?xml version="1.0" encoding="utf-8"?>
+<file path=ppt/slides/slide14.xml><?xml version="1.0" encoding="utf-8"?>
 <p:sld xmlns:a="http://schemas.openxmlformats.org/drawingml/2006/main" xmlns:r="http://schemas.openxmlformats.org/officeDocument/2006/relationships" xmlns:p="http://schemas.openxmlformats.org/presentationml/2006/main">
   <p:cSld>
     <p:spTree>
@@ -28411,7 +28186,7 @@
 </p:sld>
 </file>
 
-<file path=ppt/slides/slide16.xml><?xml version="1.0" encoding="utf-8"?>
+<file path=ppt/slides/slide15.xml><?xml version="1.0" encoding="utf-8"?>
 <p:sld xmlns:a="http://schemas.openxmlformats.org/drawingml/2006/main" xmlns:r="http://schemas.openxmlformats.org/officeDocument/2006/relationships" xmlns:p="http://schemas.openxmlformats.org/presentationml/2006/main">
   <p:cSld>
     <p:spTree>
@@ -28507,7 +28282,7 @@
 </p:sld>
 </file>
 
-<file path=ppt/slides/slide17.xml><?xml version="1.0" encoding="utf-8"?>
+<file path=ppt/slides/slide16.xml><?xml version="1.0" encoding="utf-8"?>
 <p:sld xmlns:a="http://schemas.openxmlformats.org/drawingml/2006/main" xmlns:r="http://schemas.openxmlformats.org/officeDocument/2006/relationships" xmlns:p="http://schemas.openxmlformats.org/presentationml/2006/main">
   <p:cSld>
     <p:spTree>
@@ -28705,7 +28480,7 @@
 </p:sld>
 </file>
 
-<file path=ppt/slides/slide18.xml><?xml version="1.0" encoding="utf-8"?>
+<file path=ppt/slides/slide17.xml><?xml version="1.0" encoding="utf-8"?>
 <p:sld xmlns:a="http://schemas.openxmlformats.org/drawingml/2006/main" xmlns:r="http://schemas.openxmlformats.org/officeDocument/2006/relationships" xmlns:p="http://schemas.openxmlformats.org/presentationml/2006/main">
   <p:cSld>
     <p:spTree>
@@ -29398,7 +29173,7 @@
 </p:sld>
 </file>
 
-<file path=ppt/slides/slide19.xml><?xml version="1.0" encoding="utf-8"?>
+<file path=ppt/slides/slide18.xml><?xml version="1.0" encoding="utf-8"?>
 <p:sld xmlns:a="http://schemas.openxmlformats.org/drawingml/2006/main" xmlns:r="http://schemas.openxmlformats.org/officeDocument/2006/relationships" xmlns:p="http://schemas.openxmlformats.org/presentationml/2006/main">
   <p:cSld>
     <p:spTree>
@@ -29492,6 +29267,190 @@
     <p:extLst>
       <p:ext uri="{BB962C8B-B14F-4D97-AF65-F5344CB8AC3E}">
         <p14:creationId xmlns:p14="http://schemas.microsoft.com/office/powerpoint/2010/main" val="1817511657"/>
+      </p:ext>
+    </p:extLst>
+  </p:cSld>
+  <p:clrMapOvr>
+    <a:masterClrMapping/>
+  </p:clrMapOvr>
+</p:sld>
+</file>
+
+<file path=ppt/slides/slide19.xml><?xml version="1.0" encoding="utf-8"?>
+<p:sld xmlns:a="http://schemas.openxmlformats.org/drawingml/2006/main" xmlns:r="http://schemas.openxmlformats.org/officeDocument/2006/relationships" xmlns:p="http://schemas.openxmlformats.org/presentationml/2006/main">
+  <p:cSld>
+    <p:spTree>
+      <p:nvGrpSpPr>
+        <p:cNvPr id="1" name=""/>
+        <p:cNvGrpSpPr/>
+        <p:nvPr/>
+      </p:nvGrpSpPr>
+      <p:grpSpPr>
+        <a:xfrm>
+          <a:off x="0" y="0"/>
+          <a:ext cx="0" cy="0"/>
+          <a:chOff x="0" y="0"/>
+          <a:chExt cx="0" cy="0"/>
+        </a:xfrm>
+      </p:grpSpPr>
+      <p:sp>
+        <p:nvSpPr>
+          <p:cNvPr id="2" name="Title 1"/>
+          <p:cNvSpPr>
+            <a:spLocks noGrp="1"/>
+          </p:cNvSpPr>
+          <p:nvPr>
+            <p:ph type="title"/>
+          </p:nvPr>
+        </p:nvSpPr>
+        <p:spPr/>
+        <p:txBody>
+          <a:bodyPr/>
+          <a:lstStyle/>
+          <a:p>
+            <a:r>
+              <a:rPr lang="ru-RU" dirty="0">
+                <a:solidFill>
+                  <a:schemeClr val="accent1"/>
+                </a:solidFill>
+              </a:rPr>
+              <a:t>Шпаргалка №7:</a:t>
+            </a:r>
+            <a:br>
+              <a:rPr lang="ru-RU" dirty="0"/>
+            </a:br>
+            <a:r>
+              <a:rPr lang="en-US" dirty="0"/>
+              <a:t>With….\Update…\Add…</a:t>
+            </a:r>
+          </a:p>
+        </p:txBody>
+      </p:sp>
+      <p:sp>
+        <p:nvSpPr>
+          <p:cNvPr id="4" name="Text Placeholder 3"/>
+          <p:cNvSpPr>
+            <a:spLocks noGrp="1"/>
+          </p:cNvSpPr>
+          <p:nvPr>
+            <p:ph type="body" idx="1"/>
+          </p:nvPr>
+        </p:nvSpPr>
+        <p:spPr/>
+        <p:txBody>
+          <a:bodyPr/>
+          <a:lstStyle/>
+          <a:p>
+            <a:r>
+              <a:rPr lang="en-US" dirty="0"/>
+              <a:t>With…</a:t>
+            </a:r>
+            <a:r>
+              <a:rPr lang="ru-RU" dirty="0"/>
+              <a:t>\</a:t>
+            </a:r>
+            <a:r>
+              <a:rPr lang="en-US" dirty="0"/>
+              <a:t>Update…</a:t>
+            </a:r>
+          </a:p>
+        </p:txBody>
+      </p:sp>
+      <p:sp>
+        <p:nvSpPr>
+          <p:cNvPr id="5" name="Content Placeholder 4"/>
+          <p:cNvSpPr>
+            <a:spLocks noGrp="1"/>
+          </p:cNvSpPr>
+          <p:nvPr>
+            <p:ph sz="half" idx="2"/>
+          </p:nvPr>
+        </p:nvSpPr>
+        <p:spPr/>
+        <p:txBody>
+          <a:bodyPr/>
+          <a:lstStyle/>
+          <a:p>
+            <a:r>
+              <a:rPr lang="ru-RU" dirty="0"/>
+              <a:t>Возвращает новый экземпляр с полностью замененной частью</a:t>
+            </a:r>
+          </a:p>
+          <a:p>
+            <a:r>
+              <a:rPr lang="ru-RU" dirty="0"/>
+              <a:t>Существует версия для любой части синтаксиса кнкретной </a:t>
+            </a:r>
+            <a:r>
+              <a:rPr lang="en-US" dirty="0" err="1"/>
+              <a:t>SyntaxNode</a:t>
+            </a:r>
+            <a:endParaRPr lang="ru-RU" dirty="0"/>
+          </a:p>
+          <a:p>
+            <a:r>
+              <a:rPr lang="ru-RU" dirty="0"/>
+              <a:t>Включает в себя токены</a:t>
+            </a:r>
+            <a:endParaRPr lang="en-US" dirty="0"/>
+          </a:p>
+        </p:txBody>
+      </p:sp>
+      <p:sp>
+        <p:nvSpPr>
+          <p:cNvPr id="6" name="Text Placeholder 5"/>
+          <p:cNvSpPr>
+            <a:spLocks noGrp="1"/>
+          </p:cNvSpPr>
+          <p:nvPr>
+            <p:ph type="body" sz="quarter" idx="3"/>
+          </p:nvPr>
+        </p:nvSpPr>
+        <p:spPr/>
+        <p:txBody>
+          <a:bodyPr/>
+          <a:lstStyle/>
+          <a:p>
+            <a:r>
+              <a:rPr lang="en-US" dirty="0"/>
+              <a:t>Add…</a:t>
+            </a:r>
+          </a:p>
+        </p:txBody>
+      </p:sp>
+      <p:sp>
+        <p:nvSpPr>
+          <p:cNvPr id="7" name="Content Placeholder 6"/>
+          <p:cNvSpPr>
+            <a:spLocks noGrp="1"/>
+          </p:cNvSpPr>
+          <p:nvPr>
+            <p:ph sz="quarter" idx="4"/>
+          </p:nvPr>
+        </p:nvSpPr>
+        <p:spPr/>
+        <p:txBody>
+          <a:bodyPr/>
+          <a:lstStyle/>
+          <a:p>
+            <a:r>
+              <a:rPr lang="ru-RU" dirty="0"/>
+              <a:t>Возвращает новый экземпляр с дополненой частью</a:t>
+            </a:r>
+          </a:p>
+          <a:p>
+            <a:r>
+              <a:rPr lang="ru-RU" dirty="0"/>
+              <a:t>Существует если только если в этом есть смысл</a:t>
+            </a:r>
+            <a:endParaRPr lang="en-US" dirty="0"/>
+          </a:p>
+        </p:txBody>
+      </p:sp>
+    </p:spTree>
+    <p:extLst>
+      <p:ext uri="{BB962C8B-B14F-4D97-AF65-F5344CB8AC3E}">
+        <p14:creationId xmlns:p14="http://schemas.microsoft.com/office/powerpoint/2010/main" val="3218549126"/>
       </p:ext>
     </p:extLst>
   </p:cSld>
@@ -29840,190 +29799,6 @@
                   <a:schemeClr val="accent1"/>
                 </a:solidFill>
               </a:rPr>
-              <a:t>Шпаргалка №7:</a:t>
-            </a:r>
-            <a:br>
-              <a:rPr lang="ru-RU" dirty="0"/>
-            </a:br>
-            <a:r>
-              <a:rPr lang="en-US" dirty="0"/>
-              <a:t>With….\Update…\Add…</a:t>
-            </a:r>
-          </a:p>
-        </p:txBody>
-      </p:sp>
-      <p:sp>
-        <p:nvSpPr>
-          <p:cNvPr id="4" name="Text Placeholder 3"/>
-          <p:cNvSpPr>
-            <a:spLocks noGrp="1"/>
-          </p:cNvSpPr>
-          <p:nvPr>
-            <p:ph type="body" idx="1"/>
-          </p:nvPr>
-        </p:nvSpPr>
-        <p:spPr/>
-        <p:txBody>
-          <a:bodyPr/>
-          <a:lstStyle/>
-          <a:p>
-            <a:r>
-              <a:rPr lang="en-US" dirty="0"/>
-              <a:t>With…</a:t>
-            </a:r>
-            <a:r>
-              <a:rPr lang="ru-RU" dirty="0"/>
-              <a:t>\</a:t>
-            </a:r>
-            <a:r>
-              <a:rPr lang="en-US" dirty="0"/>
-              <a:t>Update…</a:t>
-            </a:r>
-          </a:p>
-        </p:txBody>
-      </p:sp>
-      <p:sp>
-        <p:nvSpPr>
-          <p:cNvPr id="5" name="Content Placeholder 4"/>
-          <p:cNvSpPr>
-            <a:spLocks noGrp="1"/>
-          </p:cNvSpPr>
-          <p:nvPr>
-            <p:ph sz="half" idx="2"/>
-          </p:nvPr>
-        </p:nvSpPr>
-        <p:spPr/>
-        <p:txBody>
-          <a:bodyPr/>
-          <a:lstStyle/>
-          <a:p>
-            <a:r>
-              <a:rPr lang="ru-RU" dirty="0"/>
-              <a:t>Возвращает новый экземпляр с полностью замененной частью</a:t>
-            </a:r>
-          </a:p>
-          <a:p>
-            <a:r>
-              <a:rPr lang="ru-RU" dirty="0"/>
-              <a:t>Существует версия для любой части синтаксиса кнкретной </a:t>
-            </a:r>
-            <a:r>
-              <a:rPr lang="en-US" dirty="0" err="1"/>
-              <a:t>SyntaxNode</a:t>
-            </a:r>
-            <a:endParaRPr lang="ru-RU" dirty="0"/>
-          </a:p>
-          <a:p>
-            <a:r>
-              <a:rPr lang="ru-RU" dirty="0"/>
-              <a:t>Включает в себя токены</a:t>
-            </a:r>
-            <a:endParaRPr lang="en-US" dirty="0"/>
-          </a:p>
-        </p:txBody>
-      </p:sp>
-      <p:sp>
-        <p:nvSpPr>
-          <p:cNvPr id="6" name="Text Placeholder 5"/>
-          <p:cNvSpPr>
-            <a:spLocks noGrp="1"/>
-          </p:cNvSpPr>
-          <p:nvPr>
-            <p:ph type="body" sz="quarter" idx="3"/>
-          </p:nvPr>
-        </p:nvSpPr>
-        <p:spPr/>
-        <p:txBody>
-          <a:bodyPr/>
-          <a:lstStyle/>
-          <a:p>
-            <a:r>
-              <a:rPr lang="en-US" dirty="0"/>
-              <a:t>Add…</a:t>
-            </a:r>
-          </a:p>
-        </p:txBody>
-      </p:sp>
-      <p:sp>
-        <p:nvSpPr>
-          <p:cNvPr id="7" name="Content Placeholder 6"/>
-          <p:cNvSpPr>
-            <a:spLocks noGrp="1"/>
-          </p:cNvSpPr>
-          <p:nvPr>
-            <p:ph sz="quarter" idx="4"/>
-          </p:nvPr>
-        </p:nvSpPr>
-        <p:spPr/>
-        <p:txBody>
-          <a:bodyPr/>
-          <a:lstStyle/>
-          <a:p>
-            <a:r>
-              <a:rPr lang="ru-RU" dirty="0"/>
-              <a:t>Возвращает новый экземпляр с дополненой частью</a:t>
-            </a:r>
-          </a:p>
-          <a:p>
-            <a:r>
-              <a:rPr lang="ru-RU" dirty="0"/>
-              <a:t>Существует если только если в этом есть смысл</a:t>
-            </a:r>
-            <a:endParaRPr lang="en-US" dirty="0"/>
-          </a:p>
-        </p:txBody>
-      </p:sp>
-    </p:spTree>
-    <p:extLst>
-      <p:ext uri="{BB962C8B-B14F-4D97-AF65-F5344CB8AC3E}">
-        <p14:creationId xmlns:p14="http://schemas.microsoft.com/office/powerpoint/2010/main" val="3218549126"/>
-      </p:ext>
-    </p:extLst>
-  </p:cSld>
-  <p:clrMapOvr>
-    <a:masterClrMapping/>
-  </p:clrMapOvr>
-</p:sld>
-</file>
-
-<file path=ppt/slides/slide21.xml><?xml version="1.0" encoding="utf-8"?>
-<p:sld xmlns:a="http://schemas.openxmlformats.org/drawingml/2006/main" xmlns:r="http://schemas.openxmlformats.org/officeDocument/2006/relationships" xmlns:p="http://schemas.openxmlformats.org/presentationml/2006/main">
-  <p:cSld>
-    <p:spTree>
-      <p:nvGrpSpPr>
-        <p:cNvPr id="1" name=""/>
-        <p:cNvGrpSpPr/>
-        <p:nvPr/>
-      </p:nvGrpSpPr>
-      <p:grpSpPr>
-        <a:xfrm>
-          <a:off x="0" y="0"/>
-          <a:ext cx="0" cy="0"/>
-          <a:chOff x="0" y="0"/>
-          <a:chExt cx="0" cy="0"/>
-        </a:xfrm>
-      </p:grpSpPr>
-      <p:sp>
-        <p:nvSpPr>
-          <p:cNvPr id="2" name="Title 1"/>
-          <p:cNvSpPr>
-            <a:spLocks noGrp="1"/>
-          </p:cNvSpPr>
-          <p:nvPr>
-            <p:ph type="title"/>
-          </p:nvPr>
-        </p:nvSpPr>
-        <p:spPr/>
-        <p:txBody>
-          <a:bodyPr/>
-          <a:lstStyle/>
-          <a:p>
-            <a:r>
-              <a:rPr lang="ru-RU" dirty="0">
-                <a:solidFill>
-                  <a:schemeClr val="accent1"/>
-                </a:solidFill>
-              </a:rPr>
               <a:t>ШПАРГАЛКА №8:</a:t>
             </a:r>
             <a:br>
@@ -30266,7 +30041,7 @@
 </p:sld>
 </file>
 
-<file path=ppt/slides/slide22.xml><?xml version="1.0" encoding="utf-8"?>
+<file path=ppt/slides/slide21.xml><?xml version="1.0" encoding="utf-8"?>
 <p:sld xmlns:a="http://schemas.openxmlformats.org/drawingml/2006/main" xmlns:r="http://schemas.openxmlformats.org/officeDocument/2006/relationships" xmlns:p="http://schemas.openxmlformats.org/presentationml/2006/main">
   <p:cSld>
     <p:spTree>
@@ -30374,7 +30149,7 @@
 </p:sld>
 </file>
 
-<file path=ppt/slides/slide23.xml><?xml version="1.0" encoding="utf-8"?>
+<file path=ppt/slides/slide22.xml><?xml version="1.0" encoding="utf-8"?>
 <p:sld xmlns:a="http://schemas.openxmlformats.org/drawingml/2006/main" xmlns:r="http://schemas.openxmlformats.org/officeDocument/2006/relationships" xmlns:p="http://schemas.openxmlformats.org/presentationml/2006/main">
   <p:cSld>
     <p:spTree>
@@ -30468,7 +30243,7 @@
 </p:sld>
 </file>
 
-<file path=ppt/slides/slide24.xml><?xml version="1.0" encoding="utf-8"?>
+<file path=ppt/slides/slide23.xml><?xml version="1.0" encoding="utf-8"?>
 <p:sld xmlns:a="http://schemas.openxmlformats.org/drawingml/2006/main" xmlns:r="http://schemas.openxmlformats.org/officeDocument/2006/relationships" xmlns:p="http://schemas.openxmlformats.org/presentationml/2006/main">
   <p:cSld>
     <p:spTree>
@@ -30664,7 +30439,7 @@
 </p:sld>
 </file>
 
-<file path=ppt/slides/slide25.xml><?xml version="1.0" encoding="utf-8"?>
+<file path=ppt/slides/slide24.xml><?xml version="1.0" encoding="utf-8"?>
 <p:sld xmlns:a="http://schemas.openxmlformats.org/drawingml/2006/main" xmlns:r="http://schemas.openxmlformats.org/officeDocument/2006/relationships" xmlns:p="http://schemas.openxmlformats.org/presentationml/2006/main">
   <p:cSld>
     <p:spTree>
@@ -30779,7 +30554,7 @@
 </p:sld>
 </file>
 
-<file path=ppt/slides/slide26.xml><?xml version="1.0" encoding="utf-8"?>
+<file path=ppt/slides/slide25.xml><?xml version="1.0" encoding="utf-8"?>
 <p:sld xmlns:a="http://schemas.openxmlformats.org/drawingml/2006/main" xmlns:r="http://schemas.openxmlformats.org/officeDocument/2006/relationships" xmlns:p="http://schemas.openxmlformats.org/presentationml/2006/main">
   <p:cSld>
     <p:spTree>
@@ -31543,7 +31318,7 @@
 </p:sld>
 </file>
 
-<file path=ppt/slides/slide27.xml><?xml version="1.0" encoding="utf-8"?>
+<file path=ppt/slides/slide26.xml><?xml version="1.0" encoding="utf-8"?>
 <p:sld xmlns:a="http://schemas.openxmlformats.org/drawingml/2006/main" xmlns:r="http://schemas.openxmlformats.org/officeDocument/2006/relationships" xmlns:p="http://schemas.openxmlformats.org/presentationml/2006/main">
   <p:cSld>
     <p:spTree>
@@ -31800,18 +31575,18 @@
       </p:grpSpPr>
       <p:sp>
         <p:nvSpPr>
-          <p:cNvPr id="2" name="Title 1"/>
+          <p:cNvPr id="5" name="Text Placeholder 4"/>
           <p:cNvSpPr>
             <a:spLocks noGrp="1"/>
           </p:cNvSpPr>
           <p:nvPr>
-            <p:ph type="title"/>
+            <p:ph type="body" idx="1"/>
           </p:nvPr>
         </p:nvSpPr>
         <p:spPr>
           <a:xfrm>
-            <a:off x="1069848" y="484632"/>
-            <a:ext cx="7104334" cy="1609344"/>
+            <a:off x="672652" y="478074"/>
+            <a:ext cx="4754880" cy="640080"/>
           </a:xfrm>
         </p:spPr>
         <p:txBody>
@@ -31820,864 +31595,9 @@
           <a:p>
             <a:r>
               <a:rPr lang="ru-RU" dirty="0"/>
-              <a:t>Зачем писать анализаторы</a:t>
+              <a:t>До</a:t>
             </a:r>
-            <a:r>
-              <a:rPr lang="en-US" dirty="0"/>
-              <a:t>?</a:t>
-            </a:r>
-          </a:p>
-        </p:txBody>
-      </p:sp>
-      <p:sp>
-        <p:nvSpPr>
-          <p:cNvPr id="3" name="Content Placeholder 2"/>
-          <p:cNvSpPr>
-            <a:spLocks noGrp="1"/>
-          </p:cNvSpPr>
-          <p:nvPr>
-            <p:ph idx="1"/>
-          </p:nvPr>
-        </p:nvSpPr>
-        <p:spPr>
-          <a:xfrm>
-            <a:off x="3810000" y="2093976"/>
-            <a:ext cx="7104334" cy="4050792"/>
-          </a:xfrm>
-        </p:spPr>
-        <p:txBody>
-          <a:bodyPr/>
-          <a:lstStyle/>
-          <a:p>
-            <a:pPr>
-              <a:buFont typeface="Wingdings" panose="05000000000000000000" pitchFamily="2" charset="2"/>
-              <a:buChar char="Ø"/>
-            </a:pPr>
-            <a:r>
-              <a:rPr lang="ru-RU" dirty="0"/>
-              <a:t>Продвинутые сниппеты</a:t>
-            </a:r>
-          </a:p>
-          <a:p>
-            <a:pPr>
-              <a:buFont typeface="Wingdings" panose="05000000000000000000" pitchFamily="2" charset="2"/>
-              <a:buChar char="Ø"/>
-            </a:pPr>
-            <a:r>
-              <a:rPr lang="ru-RU" dirty="0"/>
-              <a:t>Инструмены кодогенерации</a:t>
-            </a:r>
-          </a:p>
-          <a:p>
-            <a:pPr>
-              <a:buFont typeface="Wingdings" panose="05000000000000000000" pitchFamily="2" charset="2"/>
-              <a:buChar char="Ø"/>
-            </a:pPr>
-            <a:r>
-              <a:rPr lang="ru-RU" dirty="0"/>
-              <a:t>Сопровождение собственного кода</a:t>
-            </a:r>
-          </a:p>
-          <a:p>
-            <a:pPr>
-              <a:buFont typeface="Wingdings" panose="05000000000000000000" pitchFamily="2" charset="2"/>
-              <a:buChar char="Ø"/>
-            </a:pPr>
-            <a:r>
-              <a:rPr lang="ru-RU" dirty="0"/>
-              <a:t>Персональная помощь при кодировании</a:t>
-            </a:r>
-          </a:p>
-          <a:p>
-            <a:pPr>
-              <a:buFont typeface="Wingdings" panose="05000000000000000000" pitchFamily="2" charset="2"/>
-              <a:buChar char="Ø"/>
-            </a:pPr>
-            <a:r>
-              <a:rPr lang="ru-RU" dirty="0"/>
-              <a:t>Следование принятым в команде кодовым практикам</a:t>
-            </a:r>
-          </a:p>
-          <a:p>
-            <a:pPr>
-              <a:buFont typeface="Wingdings" panose="05000000000000000000" pitchFamily="2" charset="2"/>
-              <a:buChar char="Ø"/>
-            </a:pPr>
-            <a:r>
-              <a:rPr lang="ru-RU" dirty="0"/>
-              <a:t>Рефакторинг кода в соответствие с кодовыми практиками</a:t>
-            </a:r>
-          </a:p>
-          <a:p>
-            <a:pPr>
-              <a:buFont typeface="Wingdings" panose="05000000000000000000" pitchFamily="2" charset="2"/>
-              <a:buChar char="Ø"/>
-            </a:pPr>
             <a:endParaRPr lang="en-US" dirty="0"/>
-          </a:p>
-        </p:txBody>
-      </p:sp>
-      <p:pic>
-        <p:nvPicPr>
-          <p:cNvPr id="5" name="Picture 4"/>
-          <p:cNvPicPr>
-            <a:picLocks noChangeAspect="1"/>
-          </p:cNvPicPr>
-          <p:nvPr/>
-        </p:nvPicPr>
-        <p:blipFill>
-          <a:blip r:embed="rId3">
-            <a:extLst>
-              <a:ext uri="{28A0092B-C50C-407E-A947-70E740481C1C}">
-                <a14:useLocalDpi xmlns:a14="http://schemas.microsoft.com/office/drawing/2010/main" val="0"/>
-              </a:ext>
-            </a:extLst>
-          </a:blip>
-          <a:stretch>
-            <a:fillRect/>
-          </a:stretch>
-        </p:blipFill>
-        <p:spPr>
-          <a:xfrm>
-            <a:off x="0" y="3048000"/>
-            <a:ext cx="3810000" cy="3810000"/>
-          </a:xfrm>
-          <a:prstGeom prst="rect">
-            <a:avLst/>
-          </a:prstGeom>
-        </p:spPr>
-      </p:pic>
-    </p:spTree>
-    <p:extLst>
-      <p:ext uri="{BB962C8B-B14F-4D97-AF65-F5344CB8AC3E}">
-        <p14:creationId xmlns:p14="http://schemas.microsoft.com/office/powerpoint/2010/main" val="3751598530"/>
-      </p:ext>
-    </p:extLst>
-  </p:cSld>
-  <p:clrMapOvr>
-    <a:masterClrMapping/>
-  </p:clrMapOvr>
-  <p:timing>
-    <p:tnLst>
-      <p:par>
-        <p:cTn id="1" dur="indefinite" restart="never" nodeType="tmRoot">
-          <p:childTnLst>
-            <p:seq concurrent="1" nextAc="seek">
-              <p:cTn id="2" dur="indefinite" nodeType="mainSeq">
-                <p:childTnLst>
-                  <p:par>
-                    <p:cTn id="3" fill="hold">
-                      <p:stCondLst>
-                        <p:cond delay="indefinite"/>
-                      </p:stCondLst>
-                      <p:childTnLst>
-                        <p:par>
-                          <p:cTn id="4" fill="hold">
-                            <p:stCondLst>
-                              <p:cond delay="0"/>
-                            </p:stCondLst>
-                            <p:childTnLst>
-                              <p:par>
-                                <p:cTn id="5" presetID="2" presetClass="entr" presetSubtype="4" fill="hold" grpId="0" nodeType="clickEffect">
-                                  <p:stCondLst>
-                                    <p:cond delay="0"/>
-                                  </p:stCondLst>
-                                  <p:childTnLst>
-                                    <p:set>
-                                      <p:cBhvr>
-                                        <p:cTn id="6" dur="1" fill="hold">
-                                          <p:stCondLst>
-                                            <p:cond delay="0"/>
-                                          </p:stCondLst>
-                                        </p:cTn>
-                                        <p:tgtEl>
-                                          <p:spTgt spid="3">
-                                            <p:txEl>
-                                              <p:pRg st="0" end="0"/>
-                                            </p:txEl>
-                                          </p:spTgt>
-                                        </p:tgtEl>
-                                        <p:attrNameLst>
-                                          <p:attrName>style.visibility</p:attrName>
-                                        </p:attrNameLst>
-                                      </p:cBhvr>
-                                      <p:to>
-                                        <p:strVal val="visible"/>
-                                      </p:to>
-                                    </p:set>
-                                    <p:anim calcmode="lin" valueType="num">
-                                      <p:cBhvr additive="base">
-                                        <p:cTn id="7" dur="500" fill="hold"/>
-                                        <p:tgtEl>
-                                          <p:spTgt spid="3">
-                                            <p:txEl>
-                                              <p:pRg st="0" end="0"/>
-                                            </p:txEl>
-                                          </p:spTgt>
-                                        </p:tgtEl>
-                                        <p:attrNameLst>
-                                          <p:attrName>ppt_x</p:attrName>
-                                        </p:attrNameLst>
-                                      </p:cBhvr>
-                                      <p:tavLst>
-                                        <p:tav tm="0">
-                                          <p:val>
-                                            <p:strVal val="#ppt_x"/>
-                                          </p:val>
-                                        </p:tav>
-                                        <p:tav tm="100000">
-                                          <p:val>
-                                            <p:strVal val="#ppt_x"/>
-                                          </p:val>
-                                        </p:tav>
-                                      </p:tavLst>
-                                    </p:anim>
-                                    <p:anim calcmode="lin" valueType="num">
-                                      <p:cBhvr additive="base">
-                                        <p:cTn id="8" dur="500" fill="hold"/>
-                                        <p:tgtEl>
-                                          <p:spTgt spid="3">
-                                            <p:txEl>
-                                              <p:pRg st="0" end="0"/>
-                                            </p:txEl>
-                                          </p:spTgt>
-                                        </p:tgtEl>
-                                        <p:attrNameLst>
-                                          <p:attrName>ppt_y</p:attrName>
-                                        </p:attrNameLst>
-                                      </p:cBhvr>
-                                      <p:tavLst>
-                                        <p:tav tm="0">
-                                          <p:val>
-                                            <p:strVal val="1+#ppt_h/2"/>
-                                          </p:val>
-                                        </p:tav>
-                                        <p:tav tm="100000">
-                                          <p:val>
-                                            <p:strVal val="#ppt_y"/>
-                                          </p:val>
-                                        </p:tav>
-                                      </p:tavLst>
-                                    </p:anim>
-                                  </p:childTnLst>
-                                </p:cTn>
-                              </p:par>
-                            </p:childTnLst>
-                          </p:cTn>
-                        </p:par>
-                      </p:childTnLst>
-                    </p:cTn>
-                  </p:par>
-                  <p:par>
-                    <p:cTn id="9" fill="hold">
-                      <p:stCondLst>
-                        <p:cond delay="indefinite"/>
-                      </p:stCondLst>
-                      <p:childTnLst>
-                        <p:par>
-                          <p:cTn id="10" fill="hold">
-                            <p:stCondLst>
-                              <p:cond delay="0"/>
-                            </p:stCondLst>
-                            <p:childTnLst>
-                              <p:par>
-                                <p:cTn id="11" presetID="2" presetClass="entr" presetSubtype="4" fill="hold" grpId="0" nodeType="clickEffect">
-                                  <p:stCondLst>
-                                    <p:cond delay="0"/>
-                                  </p:stCondLst>
-                                  <p:childTnLst>
-                                    <p:set>
-                                      <p:cBhvr>
-                                        <p:cTn id="12" dur="1" fill="hold">
-                                          <p:stCondLst>
-                                            <p:cond delay="0"/>
-                                          </p:stCondLst>
-                                        </p:cTn>
-                                        <p:tgtEl>
-                                          <p:spTgt spid="3">
-                                            <p:txEl>
-                                              <p:pRg st="1" end="1"/>
-                                            </p:txEl>
-                                          </p:spTgt>
-                                        </p:tgtEl>
-                                        <p:attrNameLst>
-                                          <p:attrName>style.visibility</p:attrName>
-                                        </p:attrNameLst>
-                                      </p:cBhvr>
-                                      <p:to>
-                                        <p:strVal val="visible"/>
-                                      </p:to>
-                                    </p:set>
-                                    <p:anim calcmode="lin" valueType="num">
-                                      <p:cBhvr additive="base">
-                                        <p:cTn id="13" dur="500" fill="hold"/>
-                                        <p:tgtEl>
-                                          <p:spTgt spid="3">
-                                            <p:txEl>
-                                              <p:pRg st="1" end="1"/>
-                                            </p:txEl>
-                                          </p:spTgt>
-                                        </p:tgtEl>
-                                        <p:attrNameLst>
-                                          <p:attrName>ppt_x</p:attrName>
-                                        </p:attrNameLst>
-                                      </p:cBhvr>
-                                      <p:tavLst>
-                                        <p:tav tm="0">
-                                          <p:val>
-                                            <p:strVal val="#ppt_x"/>
-                                          </p:val>
-                                        </p:tav>
-                                        <p:tav tm="100000">
-                                          <p:val>
-                                            <p:strVal val="#ppt_x"/>
-                                          </p:val>
-                                        </p:tav>
-                                      </p:tavLst>
-                                    </p:anim>
-                                    <p:anim calcmode="lin" valueType="num">
-                                      <p:cBhvr additive="base">
-                                        <p:cTn id="14" dur="500" fill="hold"/>
-                                        <p:tgtEl>
-                                          <p:spTgt spid="3">
-                                            <p:txEl>
-                                              <p:pRg st="1" end="1"/>
-                                            </p:txEl>
-                                          </p:spTgt>
-                                        </p:tgtEl>
-                                        <p:attrNameLst>
-                                          <p:attrName>ppt_y</p:attrName>
-                                        </p:attrNameLst>
-                                      </p:cBhvr>
-                                      <p:tavLst>
-                                        <p:tav tm="0">
-                                          <p:val>
-                                            <p:strVal val="1+#ppt_h/2"/>
-                                          </p:val>
-                                        </p:tav>
-                                        <p:tav tm="100000">
-                                          <p:val>
-                                            <p:strVal val="#ppt_y"/>
-                                          </p:val>
-                                        </p:tav>
-                                      </p:tavLst>
-                                    </p:anim>
-                                  </p:childTnLst>
-                                </p:cTn>
-                              </p:par>
-                            </p:childTnLst>
-                          </p:cTn>
-                        </p:par>
-                      </p:childTnLst>
-                    </p:cTn>
-                  </p:par>
-                  <p:par>
-                    <p:cTn id="15" fill="hold">
-                      <p:stCondLst>
-                        <p:cond delay="indefinite"/>
-                      </p:stCondLst>
-                      <p:childTnLst>
-                        <p:par>
-                          <p:cTn id="16" fill="hold">
-                            <p:stCondLst>
-                              <p:cond delay="0"/>
-                            </p:stCondLst>
-                            <p:childTnLst>
-                              <p:par>
-                                <p:cTn id="17" presetID="2" presetClass="entr" presetSubtype="4" fill="hold" grpId="0" nodeType="clickEffect">
-                                  <p:stCondLst>
-                                    <p:cond delay="0"/>
-                                  </p:stCondLst>
-                                  <p:childTnLst>
-                                    <p:set>
-                                      <p:cBhvr>
-                                        <p:cTn id="18" dur="1" fill="hold">
-                                          <p:stCondLst>
-                                            <p:cond delay="0"/>
-                                          </p:stCondLst>
-                                        </p:cTn>
-                                        <p:tgtEl>
-                                          <p:spTgt spid="3">
-                                            <p:txEl>
-                                              <p:pRg st="2" end="2"/>
-                                            </p:txEl>
-                                          </p:spTgt>
-                                        </p:tgtEl>
-                                        <p:attrNameLst>
-                                          <p:attrName>style.visibility</p:attrName>
-                                        </p:attrNameLst>
-                                      </p:cBhvr>
-                                      <p:to>
-                                        <p:strVal val="visible"/>
-                                      </p:to>
-                                    </p:set>
-                                    <p:anim calcmode="lin" valueType="num">
-                                      <p:cBhvr additive="base">
-                                        <p:cTn id="19" dur="500" fill="hold"/>
-                                        <p:tgtEl>
-                                          <p:spTgt spid="3">
-                                            <p:txEl>
-                                              <p:pRg st="2" end="2"/>
-                                            </p:txEl>
-                                          </p:spTgt>
-                                        </p:tgtEl>
-                                        <p:attrNameLst>
-                                          <p:attrName>ppt_x</p:attrName>
-                                        </p:attrNameLst>
-                                      </p:cBhvr>
-                                      <p:tavLst>
-                                        <p:tav tm="0">
-                                          <p:val>
-                                            <p:strVal val="#ppt_x"/>
-                                          </p:val>
-                                        </p:tav>
-                                        <p:tav tm="100000">
-                                          <p:val>
-                                            <p:strVal val="#ppt_x"/>
-                                          </p:val>
-                                        </p:tav>
-                                      </p:tavLst>
-                                    </p:anim>
-                                    <p:anim calcmode="lin" valueType="num">
-                                      <p:cBhvr additive="base">
-                                        <p:cTn id="20" dur="500" fill="hold"/>
-                                        <p:tgtEl>
-                                          <p:spTgt spid="3">
-                                            <p:txEl>
-                                              <p:pRg st="2" end="2"/>
-                                            </p:txEl>
-                                          </p:spTgt>
-                                        </p:tgtEl>
-                                        <p:attrNameLst>
-                                          <p:attrName>ppt_y</p:attrName>
-                                        </p:attrNameLst>
-                                      </p:cBhvr>
-                                      <p:tavLst>
-                                        <p:tav tm="0">
-                                          <p:val>
-                                            <p:strVal val="1+#ppt_h/2"/>
-                                          </p:val>
-                                        </p:tav>
-                                        <p:tav tm="100000">
-                                          <p:val>
-                                            <p:strVal val="#ppt_y"/>
-                                          </p:val>
-                                        </p:tav>
-                                      </p:tavLst>
-                                    </p:anim>
-                                  </p:childTnLst>
-                                </p:cTn>
-                              </p:par>
-                            </p:childTnLst>
-                          </p:cTn>
-                        </p:par>
-                      </p:childTnLst>
-                    </p:cTn>
-                  </p:par>
-                  <p:par>
-                    <p:cTn id="21" fill="hold">
-                      <p:stCondLst>
-                        <p:cond delay="indefinite"/>
-                      </p:stCondLst>
-                      <p:childTnLst>
-                        <p:par>
-                          <p:cTn id="22" fill="hold">
-                            <p:stCondLst>
-                              <p:cond delay="0"/>
-                            </p:stCondLst>
-                            <p:childTnLst>
-                              <p:par>
-                                <p:cTn id="23" presetID="2" presetClass="entr" presetSubtype="4" fill="hold" grpId="0" nodeType="clickEffect">
-                                  <p:stCondLst>
-                                    <p:cond delay="0"/>
-                                  </p:stCondLst>
-                                  <p:childTnLst>
-                                    <p:set>
-                                      <p:cBhvr>
-                                        <p:cTn id="24" dur="1" fill="hold">
-                                          <p:stCondLst>
-                                            <p:cond delay="0"/>
-                                          </p:stCondLst>
-                                        </p:cTn>
-                                        <p:tgtEl>
-                                          <p:spTgt spid="3">
-                                            <p:txEl>
-                                              <p:pRg st="3" end="3"/>
-                                            </p:txEl>
-                                          </p:spTgt>
-                                        </p:tgtEl>
-                                        <p:attrNameLst>
-                                          <p:attrName>style.visibility</p:attrName>
-                                        </p:attrNameLst>
-                                      </p:cBhvr>
-                                      <p:to>
-                                        <p:strVal val="visible"/>
-                                      </p:to>
-                                    </p:set>
-                                    <p:anim calcmode="lin" valueType="num">
-                                      <p:cBhvr additive="base">
-                                        <p:cTn id="25" dur="500" fill="hold"/>
-                                        <p:tgtEl>
-                                          <p:spTgt spid="3">
-                                            <p:txEl>
-                                              <p:pRg st="3" end="3"/>
-                                            </p:txEl>
-                                          </p:spTgt>
-                                        </p:tgtEl>
-                                        <p:attrNameLst>
-                                          <p:attrName>ppt_x</p:attrName>
-                                        </p:attrNameLst>
-                                      </p:cBhvr>
-                                      <p:tavLst>
-                                        <p:tav tm="0">
-                                          <p:val>
-                                            <p:strVal val="#ppt_x"/>
-                                          </p:val>
-                                        </p:tav>
-                                        <p:tav tm="100000">
-                                          <p:val>
-                                            <p:strVal val="#ppt_x"/>
-                                          </p:val>
-                                        </p:tav>
-                                      </p:tavLst>
-                                    </p:anim>
-                                    <p:anim calcmode="lin" valueType="num">
-                                      <p:cBhvr additive="base">
-                                        <p:cTn id="26" dur="500" fill="hold"/>
-                                        <p:tgtEl>
-                                          <p:spTgt spid="3">
-                                            <p:txEl>
-                                              <p:pRg st="3" end="3"/>
-                                            </p:txEl>
-                                          </p:spTgt>
-                                        </p:tgtEl>
-                                        <p:attrNameLst>
-                                          <p:attrName>ppt_y</p:attrName>
-                                        </p:attrNameLst>
-                                      </p:cBhvr>
-                                      <p:tavLst>
-                                        <p:tav tm="0">
-                                          <p:val>
-                                            <p:strVal val="1+#ppt_h/2"/>
-                                          </p:val>
-                                        </p:tav>
-                                        <p:tav tm="100000">
-                                          <p:val>
-                                            <p:strVal val="#ppt_y"/>
-                                          </p:val>
-                                        </p:tav>
-                                      </p:tavLst>
-                                    </p:anim>
-                                  </p:childTnLst>
-                                </p:cTn>
-                              </p:par>
-                            </p:childTnLst>
-                          </p:cTn>
-                        </p:par>
-                      </p:childTnLst>
-                    </p:cTn>
-                  </p:par>
-                  <p:par>
-                    <p:cTn id="27" fill="hold">
-                      <p:stCondLst>
-                        <p:cond delay="indefinite"/>
-                      </p:stCondLst>
-                      <p:childTnLst>
-                        <p:par>
-                          <p:cTn id="28" fill="hold">
-                            <p:stCondLst>
-                              <p:cond delay="0"/>
-                            </p:stCondLst>
-                            <p:childTnLst>
-                              <p:par>
-                                <p:cTn id="29" presetID="2" presetClass="entr" presetSubtype="4" fill="hold" grpId="0" nodeType="clickEffect">
-                                  <p:stCondLst>
-                                    <p:cond delay="0"/>
-                                  </p:stCondLst>
-                                  <p:childTnLst>
-                                    <p:set>
-                                      <p:cBhvr>
-                                        <p:cTn id="30" dur="1" fill="hold">
-                                          <p:stCondLst>
-                                            <p:cond delay="0"/>
-                                          </p:stCondLst>
-                                        </p:cTn>
-                                        <p:tgtEl>
-                                          <p:spTgt spid="3">
-                                            <p:txEl>
-                                              <p:pRg st="4" end="4"/>
-                                            </p:txEl>
-                                          </p:spTgt>
-                                        </p:tgtEl>
-                                        <p:attrNameLst>
-                                          <p:attrName>style.visibility</p:attrName>
-                                        </p:attrNameLst>
-                                      </p:cBhvr>
-                                      <p:to>
-                                        <p:strVal val="visible"/>
-                                      </p:to>
-                                    </p:set>
-                                    <p:anim calcmode="lin" valueType="num">
-                                      <p:cBhvr additive="base">
-                                        <p:cTn id="31" dur="500" fill="hold"/>
-                                        <p:tgtEl>
-                                          <p:spTgt spid="3">
-                                            <p:txEl>
-                                              <p:pRg st="4" end="4"/>
-                                            </p:txEl>
-                                          </p:spTgt>
-                                        </p:tgtEl>
-                                        <p:attrNameLst>
-                                          <p:attrName>ppt_x</p:attrName>
-                                        </p:attrNameLst>
-                                      </p:cBhvr>
-                                      <p:tavLst>
-                                        <p:tav tm="0">
-                                          <p:val>
-                                            <p:strVal val="#ppt_x"/>
-                                          </p:val>
-                                        </p:tav>
-                                        <p:tav tm="100000">
-                                          <p:val>
-                                            <p:strVal val="#ppt_x"/>
-                                          </p:val>
-                                        </p:tav>
-                                      </p:tavLst>
-                                    </p:anim>
-                                    <p:anim calcmode="lin" valueType="num">
-                                      <p:cBhvr additive="base">
-                                        <p:cTn id="32" dur="500" fill="hold"/>
-                                        <p:tgtEl>
-                                          <p:spTgt spid="3">
-                                            <p:txEl>
-                                              <p:pRg st="4" end="4"/>
-                                            </p:txEl>
-                                          </p:spTgt>
-                                        </p:tgtEl>
-                                        <p:attrNameLst>
-                                          <p:attrName>ppt_y</p:attrName>
-                                        </p:attrNameLst>
-                                      </p:cBhvr>
-                                      <p:tavLst>
-                                        <p:tav tm="0">
-                                          <p:val>
-                                            <p:strVal val="1+#ppt_h/2"/>
-                                          </p:val>
-                                        </p:tav>
-                                        <p:tav tm="100000">
-                                          <p:val>
-                                            <p:strVal val="#ppt_y"/>
-                                          </p:val>
-                                        </p:tav>
-                                      </p:tavLst>
-                                    </p:anim>
-                                  </p:childTnLst>
-                                </p:cTn>
-                              </p:par>
-                            </p:childTnLst>
-                          </p:cTn>
-                        </p:par>
-                      </p:childTnLst>
-                    </p:cTn>
-                  </p:par>
-                  <p:par>
-                    <p:cTn id="33" fill="hold">
-                      <p:stCondLst>
-                        <p:cond delay="indefinite"/>
-                      </p:stCondLst>
-                      <p:childTnLst>
-                        <p:par>
-                          <p:cTn id="34" fill="hold">
-                            <p:stCondLst>
-                              <p:cond delay="0"/>
-                            </p:stCondLst>
-                            <p:childTnLst>
-                              <p:par>
-                                <p:cTn id="35" presetID="2" presetClass="entr" presetSubtype="4" fill="hold" grpId="0" nodeType="clickEffect">
-                                  <p:stCondLst>
-                                    <p:cond delay="0"/>
-                                  </p:stCondLst>
-                                  <p:childTnLst>
-                                    <p:set>
-                                      <p:cBhvr>
-                                        <p:cTn id="36" dur="1" fill="hold">
-                                          <p:stCondLst>
-                                            <p:cond delay="0"/>
-                                          </p:stCondLst>
-                                        </p:cTn>
-                                        <p:tgtEl>
-                                          <p:spTgt spid="3">
-                                            <p:txEl>
-                                              <p:pRg st="5" end="5"/>
-                                            </p:txEl>
-                                          </p:spTgt>
-                                        </p:tgtEl>
-                                        <p:attrNameLst>
-                                          <p:attrName>style.visibility</p:attrName>
-                                        </p:attrNameLst>
-                                      </p:cBhvr>
-                                      <p:to>
-                                        <p:strVal val="visible"/>
-                                      </p:to>
-                                    </p:set>
-                                    <p:anim calcmode="lin" valueType="num">
-                                      <p:cBhvr additive="base">
-                                        <p:cTn id="37" dur="500" fill="hold"/>
-                                        <p:tgtEl>
-                                          <p:spTgt spid="3">
-                                            <p:txEl>
-                                              <p:pRg st="5" end="5"/>
-                                            </p:txEl>
-                                          </p:spTgt>
-                                        </p:tgtEl>
-                                        <p:attrNameLst>
-                                          <p:attrName>ppt_x</p:attrName>
-                                        </p:attrNameLst>
-                                      </p:cBhvr>
-                                      <p:tavLst>
-                                        <p:tav tm="0">
-                                          <p:val>
-                                            <p:strVal val="#ppt_x"/>
-                                          </p:val>
-                                        </p:tav>
-                                        <p:tav tm="100000">
-                                          <p:val>
-                                            <p:strVal val="#ppt_x"/>
-                                          </p:val>
-                                        </p:tav>
-                                      </p:tavLst>
-                                    </p:anim>
-                                    <p:anim calcmode="lin" valueType="num">
-                                      <p:cBhvr additive="base">
-                                        <p:cTn id="38" dur="500" fill="hold"/>
-                                        <p:tgtEl>
-                                          <p:spTgt spid="3">
-                                            <p:txEl>
-                                              <p:pRg st="5" end="5"/>
-                                            </p:txEl>
-                                          </p:spTgt>
-                                        </p:tgtEl>
-                                        <p:attrNameLst>
-                                          <p:attrName>ppt_y</p:attrName>
-                                        </p:attrNameLst>
-                                      </p:cBhvr>
-                                      <p:tavLst>
-                                        <p:tav tm="0">
-                                          <p:val>
-                                            <p:strVal val="1+#ppt_h/2"/>
-                                          </p:val>
-                                        </p:tav>
-                                        <p:tav tm="100000">
-                                          <p:val>
-                                            <p:strVal val="#ppt_y"/>
-                                          </p:val>
-                                        </p:tav>
-                                      </p:tavLst>
-                                    </p:anim>
-                                  </p:childTnLst>
-                                </p:cTn>
-                              </p:par>
-                            </p:childTnLst>
-                          </p:cTn>
-                        </p:par>
-                      </p:childTnLst>
-                    </p:cTn>
-                  </p:par>
-                </p:childTnLst>
-              </p:cTn>
-              <p:prevCondLst>
-                <p:cond evt="onPrev" delay="0">
-                  <p:tgtEl>
-                    <p:sldTgt/>
-                  </p:tgtEl>
-                </p:cond>
-              </p:prevCondLst>
-              <p:nextCondLst>
-                <p:cond evt="onNext" delay="0">
-                  <p:tgtEl>
-                    <p:sldTgt/>
-                  </p:tgtEl>
-                </p:cond>
-              </p:nextCondLst>
-            </p:seq>
-          </p:childTnLst>
-        </p:cTn>
-      </p:par>
-    </p:tnLst>
-    <p:bldLst>
-      <p:bldP spid="3" grpId="0" build="p"/>
-    </p:bldLst>
-  </p:timing>
-</p:sld>
-</file>
-
-<file path=ppt/slides/slide5.xml><?xml version="1.0" encoding="utf-8"?>
-<p:sld xmlns:a="http://schemas.openxmlformats.org/drawingml/2006/main" xmlns:r="http://schemas.openxmlformats.org/officeDocument/2006/relationships" xmlns:p="http://schemas.openxmlformats.org/presentationml/2006/main">
-  <p:cSld>
-    <p:spTree>
-      <p:nvGrpSpPr>
-        <p:cNvPr id="1" name=""/>
-        <p:cNvGrpSpPr/>
-        <p:nvPr/>
-      </p:nvGrpSpPr>
-      <p:grpSpPr>
-        <a:xfrm>
-          <a:off x="0" y="0"/>
-          <a:ext cx="0" cy="0"/>
-          <a:chOff x="0" y="0"/>
-          <a:chExt cx="0" cy="0"/>
-        </a:xfrm>
-      </p:grpSpPr>
-      <p:sp>
-        <p:nvSpPr>
-          <p:cNvPr id="2" name="Title 1"/>
-          <p:cNvSpPr>
-            <a:spLocks noGrp="1"/>
-          </p:cNvSpPr>
-          <p:nvPr>
-            <p:ph type="title"/>
-          </p:nvPr>
-        </p:nvSpPr>
-        <p:spPr/>
-        <p:txBody>
-          <a:bodyPr vert="horz" lIns="91440" tIns="45720" rIns="91440" bIns="45720" rtlCol="0" anchor="b">
-            <a:normAutofit/>
-          </a:bodyPr>
-          <a:lstStyle/>
-          <a:p>
-            <a:r>
-              <a:rPr lang="en-US" sz="6000" dirty="0">
-                <a:solidFill>
-                  <a:schemeClr val="tx1">
-                    <a:lumMod val="85000"/>
-                    <a:lumOff val="15000"/>
-                  </a:schemeClr>
-                </a:solidFill>
-              </a:rPr>
-              <a:t>Service</a:t>
-            </a:r>
-            <a:r>
-              <a:rPr lang="ru-RU" sz="6000" dirty="0">
-                <a:solidFill>
-                  <a:schemeClr val="tx1">
-                    <a:lumMod val="85000"/>
-                    <a:lumOff val="15000"/>
-                  </a:schemeClr>
-                </a:solidFill>
-              </a:rPr>
-              <a:t> </a:t>
-            </a:r>
-            <a:r>
-              <a:rPr lang="en-US" sz="6000" dirty="0">
-                <a:solidFill>
-                  <a:schemeClr val="tx1">
-                    <a:lumMod val="85000"/>
-                    <a:lumOff val="15000"/>
-                  </a:schemeClr>
-                </a:solidFill>
-              </a:rPr>
-              <a:t>Locator killer</a:t>
-            </a:r>
           </a:p>
         </p:txBody>
       </p:sp>
@@ -32688,7 +31608,7 @@
             <a:picLocks noGrp="1" noChangeAspect="1"/>
           </p:cNvPicPr>
           <p:nvPr>
-            <p:ph sz="half" idx="1"/>
+            <p:ph sz="half" idx="2"/>
           </p:nvPr>
         </p:nvPicPr>
         <p:blipFill>
@@ -32705,11 +31625,39 @@
         </p:blipFill>
         <p:spPr>
           <a:xfrm>
-            <a:off x="1582912" y="2193925"/>
-            <a:ext cx="3728688" cy="3978275"/>
+            <a:off x="672652" y="1118154"/>
+            <a:ext cx="4754880" cy="5073158"/>
           </a:xfrm>
         </p:spPr>
       </p:pic>
+      <p:sp>
+        <p:nvSpPr>
+          <p:cNvPr id="6" name="Text Placeholder 5"/>
+          <p:cNvSpPr>
+            <a:spLocks noGrp="1"/>
+          </p:cNvSpPr>
+          <p:nvPr>
+            <p:ph type="body" sz="quarter" idx="3"/>
+          </p:nvPr>
+        </p:nvSpPr>
+        <p:spPr>
+          <a:xfrm>
+            <a:off x="5824696" y="478074"/>
+            <a:ext cx="4754880" cy="640080"/>
+          </a:xfrm>
+        </p:spPr>
+        <p:txBody>
+          <a:bodyPr/>
+          <a:lstStyle/>
+          <a:p>
+            <a:r>
+              <a:rPr lang="ru-RU" dirty="0"/>
+              <a:t>После</a:t>
+            </a:r>
+            <a:endParaRPr lang="en-US" dirty="0"/>
+          </a:p>
+        </p:txBody>
+      </p:sp>
       <p:pic>
         <p:nvPicPr>
           <p:cNvPr id="58" name="Content Placeholder 57"/>
@@ -32717,7 +31665,7 @@
             <a:picLocks noGrp="1" noChangeAspect="1"/>
           </p:cNvPicPr>
           <p:nvPr>
-            <p:ph sz="half" idx="2"/>
+            <p:ph sz="quarter" idx="4"/>
           </p:nvPr>
         </p:nvPicPr>
         <p:blipFill>
@@ -32734,8 +31682,8 @@
         </p:blipFill>
         <p:spPr>
           <a:xfrm>
-            <a:off x="6364288" y="2270266"/>
-            <a:ext cx="4754562" cy="3825593"/>
+            <a:off x="5824696" y="1118154"/>
+            <a:ext cx="6305072" cy="5073158"/>
           </a:xfrm>
         </p:spPr>
       </p:pic>
@@ -32749,85 +31697,10 @@
   <p:clrMapOvr>
     <a:masterClrMapping/>
   </p:clrMapOvr>
-  <p:timing>
-    <p:tnLst>
-      <p:par>
-        <p:cTn id="1" dur="indefinite" restart="never" nodeType="tmRoot">
-          <p:childTnLst>
-            <p:seq concurrent="1" nextAc="seek">
-              <p:cTn id="2" dur="indefinite" nodeType="mainSeq">
-                <p:childTnLst>
-                  <p:par>
-                    <p:cTn id="3" fill="hold">
-                      <p:stCondLst>
-                        <p:cond delay="indefinite"/>
-                      </p:stCondLst>
-                      <p:childTnLst>
-                        <p:par>
-                          <p:cTn id="4" fill="hold">
-                            <p:stCondLst>
-                              <p:cond delay="0"/>
-                            </p:stCondLst>
-                            <p:childTnLst>
-                              <p:par>
-                                <p:cTn id="5" presetID="1" presetClass="entr" presetSubtype="0" fill="hold" nodeType="clickEffect">
-                                  <p:stCondLst>
-                                    <p:cond delay="0"/>
-                                  </p:stCondLst>
-                                  <p:childTnLst>
-                                    <p:set>
-                                      <p:cBhvr>
-                                        <p:cTn id="6" dur="1" fill="hold">
-                                          <p:stCondLst>
-                                            <p:cond delay="0"/>
-                                          </p:stCondLst>
-                                        </p:cTn>
-                                        <p:tgtEl>
-                                          <p:spTgt spid="58"/>
-                                        </p:tgtEl>
-                                        <p:attrNameLst>
-                                          <p:attrName>style.visibility</p:attrName>
-                                        </p:attrNameLst>
-                                      </p:cBhvr>
-                                      <p:to>
-                                        <p:strVal val="visible"/>
-                                      </p:to>
-                                    </p:set>
-                                  </p:childTnLst>
-                                </p:cTn>
-                              </p:par>
-                            </p:childTnLst>
-                          </p:cTn>
-                        </p:par>
-                      </p:childTnLst>
-                    </p:cTn>
-                  </p:par>
-                </p:childTnLst>
-              </p:cTn>
-              <p:prevCondLst>
-                <p:cond evt="onPrev" delay="0">
-                  <p:tgtEl>
-                    <p:sldTgt/>
-                  </p:tgtEl>
-                </p:cond>
-              </p:prevCondLst>
-              <p:nextCondLst>
-                <p:cond evt="onNext" delay="0">
-                  <p:tgtEl>
-                    <p:sldTgt/>
-                  </p:tgtEl>
-                </p:cond>
-              </p:nextCondLst>
-            </p:seq>
-          </p:childTnLst>
-        </p:cTn>
-      </p:par>
-    </p:tnLst>
-  </p:timing>
 </p:sld>
 </file>
 
-<file path=ppt/slides/slide6.xml><?xml version="1.0" encoding="utf-8"?>
+<file path=ppt/slides/slide5.xml><?xml version="1.0" encoding="utf-8"?>
 <p:sld xmlns:a="http://schemas.openxmlformats.org/drawingml/2006/main" xmlns:r="http://schemas.openxmlformats.org/officeDocument/2006/relationships" xmlns:p="http://schemas.openxmlformats.org/presentationml/2006/main">
   <p:cSld>
     <p:spTree>
@@ -33617,7 +32490,7 @@
 </p:sld>
 </file>
 
-<file path=ppt/slides/slide7.xml><?xml version="1.0" encoding="utf-8"?>
+<file path=ppt/slides/slide6.xml><?xml version="1.0" encoding="utf-8"?>
 <p:sld xmlns:a="http://schemas.openxmlformats.org/drawingml/2006/main" xmlns:r="http://schemas.openxmlformats.org/officeDocument/2006/relationships" xmlns:p="http://schemas.openxmlformats.org/presentationml/2006/main">
   <p:cSld>
     <p:spTree>
@@ -33957,115 +32830,10 @@
   <p:clrMapOvr>
     <a:masterClrMapping/>
   </p:clrMapOvr>
-  <p:timing>
-    <p:tnLst>
-      <p:par>
-        <p:cTn id="1" dur="indefinite" restart="never" nodeType="tmRoot">
-          <p:childTnLst>
-            <p:seq concurrent="1" nextAc="seek">
-              <p:cTn id="2" dur="indefinite" nodeType="mainSeq">
-                <p:childTnLst>
-                  <p:par>
-                    <p:cTn id="3" fill="hold">
-                      <p:stCondLst>
-                        <p:cond delay="indefinite"/>
-                      </p:stCondLst>
-                      <p:childTnLst>
-                        <p:par>
-                          <p:cTn id="4" fill="hold">
-                            <p:stCondLst>
-                              <p:cond delay="0"/>
-                            </p:stCondLst>
-                            <p:childTnLst>
-                              <p:par>
-                                <p:cTn id="5" presetID="1" presetClass="entr" presetSubtype="0" fill="hold" grpId="0" nodeType="clickEffect">
-                                  <p:stCondLst>
-                                    <p:cond delay="0"/>
-                                  </p:stCondLst>
-                                  <p:childTnLst>
-                                    <p:set>
-                                      <p:cBhvr>
-                                        <p:cTn id="6" dur="1" fill="hold">
-                                          <p:stCondLst>
-                                            <p:cond delay="0"/>
-                                          </p:stCondLst>
-                                        </p:cTn>
-                                        <p:tgtEl>
-                                          <p:spTgt spid="16"/>
-                                        </p:tgtEl>
-                                        <p:attrNameLst>
-                                          <p:attrName>style.visibility</p:attrName>
-                                        </p:attrNameLst>
-                                      </p:cBhvr>
-                                      <p:to>
-                                        <p:strVal val="visible"/>
-                                      </p:to>
-                                    </p:set>
-                                  </p:childTnLst>
-                                </p:cTn>
-                              </p:par>
-                              <p:par>
-                                <p:cTn id="7" presetID="1" presetClass="entr" presetSubtype="0" fill="hold" nodeType="withEffect">
-                                  <p:stCondLst>
-                                    <p:cond delay="0"/>
-                                  </p:stCondLst>
-                                  <p:childTnLst>
-                                    <p:set>
-                                      <p:cBhvr>
-                                        <p:cTn id="8" dur="1" fill="hold">
-                                          <p:stCondLst>
-                                            <p:cond delay="0"/>
-                                          </p:stCondLst>
-                                        </p:cTn>
-                                        <p:tgtEl>
-                                          <p:spTgt spid="59"/>
-                                        </p:tgtEl>
-                                        <p:attrNameLst>
-                                          <p:attrName>style.visibility</p:attrName>
-                                        </p:attrNameLst>
-                                      </p:cBhvr>
-                                      <p:to>
-                                        <p:strVal val="visible"/>
-                                      </p:to>
-                                    </p:set>
-                                  </p:childTnLst>
-                                </p:cTn>
-                              </p:par>
-                            </p:childTnLst>
-                          </p:cTn>
-                        </p:par>
-                      </p:childTnLst>
-                    </p:cTn>
-                  </p:par>
-                </p:childTnLst>
-              </p:cTn>
-              <p:prevCondLst>
-                <p:cond evt="onPrev" delay="0">
-                  <p:tgtEl>
-                    <p:sldTgt/>
-                  </p:tgtEl>
-                </p:cond>
-              </p:prevCondLst>
-              <p:nextCondLst>
-                <p:cond evt="onNext" delay="0">
-                  <p:tgtEl>
-                    <p:sldTgt/>
-                  </p:tgtEl>
-                </p:cond>
-              </p:nextCondLst>
-            </p:seq>
-          </p:childTnLst>
-        </p:cTn>
-      </p:par>
-    </p:tnLst>
-    <p:bldLst>
-      <p:bldP spid="16" grpId="0"/>
-    </p:bldLst>
-  </p:timing>
 </p:sld>
 </file>
 
-<file path=ppt/slides/slide8.xml><?xml version="1.0" encoding="utf-8"?>
+<file path=ppt/slides/slide7.xml><?xml version="1.0" encoding="utf-8"?>
 <p:sld xmlns:a="http://schemas.openxmlformats.org/drawingml/2006/main" xmlns:r="http://schemas.openxmlformats.org/officeDocument/2006/relationships" xmlns:p="http://schemas.openxmlformats.org/presentationml/2006/main">
   <p:cSld>
     <p:spTree>
@@ -34276,7 +33044,7 @@
 </p:sld>
 </file>
 
-<file path=ppt/slides/slide9.xml><?xml version="1.0" encoding="utf-8"?>
+<file path=ppt/slides/slide8.xml><?xml version="1.0" encoding="utf-8"?>
 <p:sld xmlns:a="http://schemas.openxmlformats.org/drawingml/2006/main" xmlns:r="http://schemas.openxmlformats.org/officeDocument/2006/relationships" xmlns:p="http://schemas.openxmlformats.org/presentationml/2006/main">
   <p:cSld>
     <p:spTree>
@@ -34392,6 +33160,127 @@
     <p:extLst>
       <p:ext uri="{BB962C8B-B14F-4D97-AF65-F5344CB8AC3E}">
         <p14:creationId xmlns:p14="http://schemas.microsoft.com/office/powerpoint/2010/main" val="2351405725"/>
+      </p:ext>
+    </p:extLst>
+  </p:cSld>
+  <p:clrMapOvr>
+    <a:masterClrMapping/>
+  </p:clrMapOvr>
+</p:sld>
+</file>
+
+<file path=ppt/slides/slide9.xml><?xml version="1.0" encoding="utf-8"?>
+<p:sld xmlns:a="http://schemas.openxmlformats.org/drawingml/2006/main" xmlns:r="http://schemas.openxmlformats.org/officeDocument/2006/relationships" xmlns:p="http://schemas.openxmlformats.org/presentationml/2006/main">
+  <p:cSld>
+    <p:spTree>
+      <p:nvGrpSpPr>
+        <p:cNvPr id="1" name=""/>
+        <p:cNvGrpSpPr/>
+        <p:nvPr/>
+      </p:nvGrpSpPr>
+      <p:grpSpPr>
+        <a:xfrm>
+          <a:off x="0" y="0"/>
+          <a:ext cx="0" cy="0"/>
+          <a:chOff x="0" y="0"/>
+          <a:chExt cx="0" cy="0"/>
+        </a:xfrm>
+      </p:grpSpPr>
+      <p:sp>
+        <p:nvSpPr>
+          <p:cNvPr id="2" name="Title 1"/>
+          <p:cNvSpPr>
+            <a:spLocks noGrp="1"/>
+          </p:cNvSpPr>
+          <p:nvPr>
+            <p:ph type="title"/>
+          </p:nvPr>
+        </p:nvSpPr>
+        <p:spPr>
+          <a:xfrm>
+            <a:off x="8549639" y="685800"/>
+            <a:ext cx="3513051" cy="1737360"/>
+          </a:xfrm>
+        </p:spPr>
+        <p:txBody>
+          <a:bodyPr>
+            <a:normAutofit fontScale="90000"/>
+          </a:bodyPr>
+          <a:lstStyle/>
+          <a:p>
+            <a:r>
+              <a:rPr lang="ru-RU" dirty="0">
+                <a:solidFill>
+                  <a:schemeClr val="accent1"/>
+                </a:solidFill>
+              </a:rPr>
+              <a:t>Неочевидность №3:</a:t>
+            </a:r>
+            <a:br>
+              <a:rPr lang="ru-RU" dirty="0"/>
+            </a:br>
+            <a:r>
+              <a:rPr lang="ru-RU" dirty="0"/>
+              <a:t>100 простых анализаторов</a:t>
+            </a:r>
+            <a:endParaRPr lang="en-US" dirty="0"/>
+          </a:p>
+        </p:txBody>
+      </p:sp>
+      <p:sp>
+        <p:nvSpPr>
+          <p:cNvPr id="4" name="Subtitle 3"/>
+          <p:cNvSpPr>
+            <a:spLocks noGrp="1"/>
+          </p:cNvSpPr>
+          <p:nvPr>
+            <p:ph type="body" sz="half" idx="2"/>
+          </p:nvPr>
+        </p:nvSpPr>
+        <p:spPr/>
+        <p:txBody>
+          <a:bodyPr>
+            <a:normAutofit/>
+          </a:bodyPr>
+          <a:lstStyle/>
+          <a:p>
+            <a:r>
+              <a:rPr lang="ru-RU" sz="2400" dirty="0"/>
+              <a:t>Лучше одного сложного!</a:t>
+            </a:r>
+            <a:endParaRPr lang="en-US" sz="2400" dirty="0"/>
+          </a:p>
+        </p:txBody>
+      </p:sp>
+      <p:pic>
+        <p:nvPicPr>
+          <p:cNvPr id="8" name="Picture Placeholder 7"/>
+          <p:cNvPicPr>
+            <a:picLocks noGrp="1" noChangeAspect="1"/>
+          </p:cNvPicPr>
+          <p:nvPr>
+            <p:ph type="pic" idx="1"/>
+          </p:nvPr>
+        </p:nvPicPr>
+        <p:blipFill>
+          <a:blip r:embed="rId2">
+            <a:extLst>
+              <a:ext uri="{28A0092B-C50C-407E-A947-70E740481C1C}">
+                <a14:useLocalDpi xmlns:a14="http://schemas.microsoft.com/office/drawing/2010/main" val="0"/>
+              </a:ext>
+            </a:extLst>
+          </a:blip>
+          <a:srcRect l="15944" r="15944"/>
+          <a:stretch>
+            <a:fillRect/>
+          </a:stretch>
+        </p:blipFill>
+        <p:spPr/>
+      </p:pic>
+    </p:spTree>
+    <p:extLst>
+      <p:ext uri="{BB962C8B-B14F-4D97-AF65-F5344CB8AC3E}">
+        <p14:creationId xmlns:p14="http://schemas.microsoft.com/office/powerpoint/2010/main" val="730781295"/>
       </p:ext>
     </p:extLst>
   </p:cSld>

</xml_diff>